<commit_message>
clean up cfg slides with consistent font
</commit_message>
<xml_diff>
--- a/assets/ppt/cfg/cfg3-pda.pptx
+++ b/assets/ppt/cfg/cfg3-pda.pptx
@@ -2,7 +2,7 @@
 <file path=ppt/presentation.xml><?xml version="1.0" encoding="utf-8"?>
 <p:presentation xmlns:a="http://schemas.openxmlformats.org/drawingml/2006/main" xmlns:r="http://schemas.openxmlformats.org/officeDocument/2006/relationships" xmlns:p="http://schemas.openxmlformats.org/presentationml/2006/main" strictFirstAndLastChars="0" saveSubsetFonts="1" autoCompressPictures="0">
   <p:sldMasterIdLst>
-    <p:sldMasterId id="2147483648" r:id="rId1"/>
+    <p:sldMasterId id="2147483660" r:id="rId1"/>
   </p:sldMasterIdLst>
   <p:notesMasterIdLst>
     <p:notesMasterId r:id="rId10"/>
@@ -147,6 +147,22 @@
       </a:defRPr>
     </a:lvl9pPr>
   </p:defaultTextStyle>
+  <p:extLst>
+    <p:ext uri="{EFAFB233-063F-42B5-8137-9DF3F51BA10A}">
+      <p15:sldGuideLst xmlns:p15="http://schemas.microsoft.com/office/powerpoint/2012/main">
+        <p15:guide id="1" orient="horz" pos="2160">
+          <p15:clr>
+            <a:srgbClr val="A4A3A4"/>
+          </p15:clr>
+        </p15:guide>
+        <p15:guide id="2" pos="2880">
+          <p15:clr>
+            <a:srgbClr val="A4A3A4"/>
+          </p15:clr>
+        </p15:guide>
+      </p15:sldGuideLst>
+    </p:ext>
+  </p:extLst>
 </p:presentation>
 </file>
 
@@ -1439,13 +1455,19 @@
         </p:spPr>
         <p:txBody>
           <a:bodyPr/>
-          <a:lstStyle/>
-          <a:p>
-            <a:r>
-              <a:rPr lang="en-CA" smtClean="0"/>
+          <a:lstStyle>
+            <a:lvl1pPr>
+              <a:defRPr>
+                <a:latin typeface="+mj-lt"/>
+              </a:defRPr>
+            </a:lvl1pPr>
+          </a:lstStyle>
+          <a:p>
+            <a:r>
+              <a:rPr lang="en-CA" dirty="0"/>
               <a:t>Click to edit Master title style</a:t>
             </a:r>
-            <a:endParaRPr lang="en-US"/>
+            <a:endParaRPr lang="en-US" dirty="0"/>
           </a:p>
         </p:txBody>
       </p:sp>
@@ -1470,7 +1492,9 @@
           <a:lstStyle>
             <a:lvl1pPr marL="0" indent="0" algn="ctr">
               <a:buNone/>
-              <a:defRPr/>
+              <a:defRPr>
+                <a:latin typeface="+mn-lt"/>
+              </a:defRPr>
             </a:lvl1pPr>
             <a:lvl2pPr marL="457200" indent="0" algn="ctr">
               <a:buNone/>
@@ -1507,93 +1531,74 @@
           </a:lstStyle>
           <a:p>
             <a:r>
-              <a:rPr lang="en-CA" smtClean="0"/>
+              <a:rPr lang="en-CA" dirty="0"/>
               <a:t>Click to edit Master subtitle style</a:t>
             </a:r>
-            <a:endParaRPr lang="en-US"/>
+            <a:endParaRPr lang="en-US" dirty="0"/>
           </a:p>
         </p:txBody>
       </p:sp>
       <p:sp>
         <p:nvSpPr>
-          <p:cNvPr id="4" name="Date Placeholder 3"/>
+          <p:cNvPr id="7" name="Footer Placeholder 6">
+            <a:extLst>
+              <a:ext uri="{FF2B5EF4-FFF2-40B4-BE49-F238E27FC236}">
+                <a16:creationId xmlns:a16="http://schemas.microsoft.com/office/drawing/2014/main" id="{CA57918C-4FEB-FC4B-889D-A7B37C602A61}"/>
+              </a:ext>
+            </a:extLst>
+          </p:cNvPr>
           <p:cNvSpPr>
             <a:spLocks noGrp="1"/>
           </p:cNvSpPr>
           <p:nvPr>
-            <p:ph type="dt" sz="half" idx="10"/>
+            <p:ph type="ftr" sz="quarter" idx="10"/>
           </p:nvPr>
         </p:nvSpPr>
         <p:spPr/>
         <p:txBody>
           <a:bodyPr/>
-          <a:lstStyle>
-            <a:lvl1pPr>
-              <a:defRPr smtClean="0"/>
-            </a:lvl1pPr>
-          </a:lstStyle>
-          <a:p>
-            <a:fld id="{BB10D2A1-AA16-124C-8724-E871FC52E9A7}" type="datetime1">
-              <a:rPr lang="en-US"/>
-              <a:pPr/>
-              <a:t>16-06-14</a:t>
-            </a:fld>
+          <a:lstStyle/>
+          <a:p>
             <a:endParaRPr lang="en-US"/>
           </a:p>
         </p:txBody>
       </p:sp>
       <p:sp>
         <p:nvSpPr>
-          <p:cNvPr id="5" name="Footer Placeholder 4"/>
+          <p:cNvPr id="8" name="Slide Number Placeholder 7">
+            <a:extLst>
+              <a:ext uri="{FF2B5EF4-FFF2-40B4-BE49-F238E27FC236}">
+                <a16:creationId xmlns:a16="http://schemas.microsoft.com/office/drawing/2014/main" id="{CE5DA644-BA1F-AA47-BA1C-083A9F7BC576}"/>
+              </a:ext>
+            </a:extLst>
+          </p:cNvPr>
           <p:cNvSpPr>
             <a:spLocks noGrp="1"/>
           </p:cNvSpPr>
           <p:nvPr>
-            <p:ph type="ftr" sz="quarter" idx="11"/>
+            <p:ph type="sldNum" sz="quarter" idx="11"/>
           </p:nvPr>
         </p:nvSpPr>
         <p:spPr/>
         <p:txBody>
           <a:bodyPr/>
-          <a:lstStyle>
-            <a:lvl1pPr>
-              <a:defRPr/>
-            </a:lvl1pPr>
-          </a:lstStyle>
-          <a:p>
-            <a:endParaRPr lang="en-US"/>
-          </a:p>
-        </p:txBody>
-      </p:sp>
-      <p:sp>
-        <p:nvSpPr>
-          <p:cNvPr id="6" name="Slide Number Placeholder 5"/>
-          <p:cNvSpPr>
-            <a:spLocks noGrp="1"/>
-          </p:cNvSpPr>
-          <p:nvPr>
-            <p:ph type="sldNum" sz="quarter" idx="12"/>
-          </p:nvPr>
-        </p:nvSpPr>
-        <p:spPr/>
-        <p:txBody>
-          <a:bodyPr/>
-          <a:lstStyle>
-            <a:lvl1pPr>
-              <a:defRPr smtClean="0"/>
-            </a:lvl1pPr>
-          </a:lstStyle>
-          <a:p>
-            <a:fld id="{6EE4AD0E-E41E-A948-ABBD-15AD007DE1F0}" type="slidenum">
-              <a:rPr lang="en-US"/>
+          <a:lstStyle/>
+          <a:p>
+            <a:fld id="{95FC67CD-6733-D04F-B9BE-AD105949F24E}" type="slidenum">
+              <a:rPr lang="en-US" smtClean="0"/>
               <a:pPr/>
               <a:t>‹#›</a:t>
             </a:fld>
-            <a:endParaRPr lang="en-US"/>
+            <a:endParaRPr lang="en-US" dirty="0"/>
           </a:p>
         </p:txBody>
       </p:sp>
     </p:spTree>
+    <p:extLst>
+      <p:ext uri="{BB962C8B-B14F-4D97-AF65-F5344CB8AC3E}">
+        <p14:creationId xmlns:p14="http://schemas.microsoft.com/office/powerpoint/2010/main" val="2693658487"/>
+      </p:ext>
+    </p:extLst>
   </p:cSld>
   <p:clrMapOvr>
     <a:masterClrMapping/>
@@ -1631,13 +1636,19 @@
         <p:spPr/>
         <p:txBody>
           <a:bodyPr/>
-          <a:lstStyle/>
-          <a:p>
-            <a:r>
-              <a:rPr lang="en-CA" smtClean="0"/>
+          <a:lstStyle>
+            <a:lvl1pPr>
+              <a:defRPr>
+                <a:latin typeface="+mj-lt"/>
+              </a:defRPr>
+            </a:lvl1pPr>
+          </a:lstStyle>
+          <a:p>
+            <a:r>
+              <a:rPr lang="en-CA" dirty="0"/>
               <a:t>Click to edit Master title style</a:t>
             </a:r>
-            <a:endParaRPr lang="en-US"/>
+            <a:endParaRPr lang="en-US" dirty="0"/>
           </a:p>
         </p:txBody>
       </p:sp>
@@ -1654,125 +1665,132 @@
         <p:spPr/>
         <p:txBody>
           <a:bodyPr vert="eaVert"/>
-          <a:lstStyle/>
+          <a:lstStyle>
+            <a:lvl1pPr>
+              <a:defRPr>
+                <a:latin typeface="+mn-lt"/>
+              </a:defRPr>
+            </a:lvl1pPr>
+            <a:lvl2pPr>
+              <a:defRPr>
+                <a:latin typeface="+mn-lt"/>
+              </a:defRPr>
+            </a:lvl2pPr>
+            <a:lvl3pPr>
+              <a:defRPr>
+                <a:latin typeface="+mn-lt"/>
+              </a:defRPr>
+            </a:lvl3pPr>
+            <a:lvl4pPr>
+              <a:defRPr>
+                <a:latin typeface="+mn-lt"/>
+              </a:defRPr>
+            </a:lvl4pPr>
+            <a:lvl5pPr>
+              <a:defRPr>
+                <a:latin typeface="+mn-lt"/>
+              </a:defRPr>
+            </a:lvl5pPr>
+          </a:lstStyle>
           <a:p>
             <a:pPr lvl="0"/>
             <a:r>
-              <a:rPr lang="en-CA" smtClean="0"/>
+              <a:rPr lang="en-CA" dirty="0"/>
               <a:t>Click to edit Master text styles</a:t>
             </a:r>
           </a:p>
           <a:p>
             <a:pPr lvl="1"/>
             <a:r>
-              <a:rPr lang="en-CA" smtClean="0"/>
+              <a:rPr lang="en-CA" dirty="0"/>
               <a:t>Second level</a:t>
             </a:r>
           </a:p>
           <a:p>
             <a:pPr lvl="2"/>
             <a:r>
-              <a:rPr lang="en-CA" smtClean="0"/>
+              <a:rPr lang="en-CA" dirty="0"/>
               <a:t>Third level</a:t>
             </a:r>
           </a:p>
           <a:p>
             <a:pPr lvl="3"/>
             <a:r>
-              <a:rPr lang="en-CA" smtClean="0"/>
+              <a:rPr lang="en-CA" dirty="0"/>
               <a:t>Fourth level</a:t>
             </a:r>
           </a:p>
           <a:p>
             <a:pPr lvl="4"/>
             <a:r>
-              <a:rPr lang="en-CA" smtClean="0"/>
+              <a:rPr lang="en-CA" dirty="0"/>
               <a:t>Fifth level</a:t>
             </a:r>
-            <a:endParaRPr lang="en-US"/>
+            <a:endParaRPr lang="en-US" dirty="0"/>
           </a:p>
         </p:txBody>
       </p:sp>
       <p:sp>
         <p:nvSpPr>
-          <p:cNvPr id="4" name="Date Placeholder 3"/>
+          <p:cNvPr id="7" name="Footer Placeholder 6">
+            <a:extLst>
+              <a:ext uri="{FF2B5EF4-FFF2-40B4-BE49-F238E27FC236}">
+                <a16:creationId xmlns:a16="http://schemas.microsoft.com/office/drawing/2014/main" id="{A94622E8-716D-2543-B902-025F35883533}"/>
+              </a:ext>
+            </a:extLst>
+          </p:cNvPr>
           <p:cNvSpPr>
             <a:spLocks noGrp="1"/>
           </p:cNvSpPr>
           <p:nvPr>
-            <p:ph type="dt" sz="half" idx="10"/>
+            <p:ph type="ftr" sz="quarter" idx="10"/>
           </p:nvPr>
         </p:nvSpPr>
         <p:spPr/>
         <p:txBody>
           <a:bodyPr/>
-          <a:lstStyle>
-            <a:lvl1pPr>
-              <a:defRPr smtClean="0"/>
-            </a:lvl1pPr>
-          </a:lstStyle>
-          <a:p>
-            <a:fld id="{1785DF61-96F8-3448-B30E-7E61CA41DDB4}" type="datetime1">
-              <a:rPr lang="en-US"/>
-              <a:pPr/>
-              <a:t>16-06-14</a:t>
-            </a:fld>
+          <a:lstStyle/>
+          <a:p>
             <a:endParaRPr lang="en-US"/>
           </a:p>
         </p:txBody>
       </p:sp>
       <p:sp>
         <p:nvSpPr>
-          <p:cNvPr id="5" name="Footer Placeholder 4"/>
+          <p:cNvPr id="8" name="Slide Number Placeholder 7">
+            <a:extLst>
+              <a:ext uri="{FF2B5EF4-FFF2-40B4-BE49-F238E27FC236}">
+                <a16:creationId xmlns:a16="http://schemas.microsoft.com/office/drawing/2014/main" id="{7524F093-4E36-C741-82AF-EEB7333B34DF}"/>
+              </a:ext>
+            </a:extLst>
+          </p:cNvPr>
           <p:cNvSpPr>
             <a:spLocks noGrp="1"/>
           </p:cNvSpPr>
           <p:nvPr>
-            <p:ph type="ftr" sz="quarter" idx="11"/>
+            <p:ph type="sldNum" sz="quarter" idx="11"/>
           </p:nvPr>
         </p:nvSpPr>
         <p:spPr/>
         <p:txBody>
           <a:bodyPr/>
-          <a:lstStyle>
-            <a:lvl1pPr>
-              <a:defRPr/>
-            </a:lvl1pPr>
-          </a:lstStyle>
-          <a:p>
-            <a:endParaRPr lang="en-US"/>
-          </a:p>
-        </p:txBody>
-      </p:sp>
-      <p:sp>
-        <p:nvSpPr>
-          <p:cNvPr id="6" name="Slide Number Placeholder 5"/>
-          <p:cNvSpPr>
-            <a:spLocks noGrp="1"/>
-          </p:cNvSpPr>
-          <p:nvPr>
-            <p:ph type="sldNum" sz="quarter" idx="12"/>
-          </p:nvPr>
-        </p:nvSpPr>
-        <p:spPr/>
-        <p:txBody>
-          <a:bodyPr/>
-          <a:lstStyle>
-            <a:lvl1pPr>
-              <a:defRPr smtClean="0"/>
-            </a:lvl1pPr>
-          </a:lstStyle>
-          <a:p>
-            <a:fld id="{F49A7E33-8984-B24C-ACBF-89B0D9B595D9}" type="slidenum">
-              <a:rPr lang="en-US"/>
+          <a:lstStyle/>
+          <a:p>
+            <a:fld id="{95FC67CD-6733-D04F-B9BE-AD105949F24E}" type="slidenum">
+              <a:rPr lang="en-US" smtClean="0"/>
               <a:pPr/>
               <a:t>‹#›</a:t>
             </a:fld>
-            <a:endParaRPr lang="en-US"/>
+            <a:endParaRPr lang="en-US" dirty="0"/>
           </a:p>
         </p:txBody>
       </p:sp>
     </p:spTree>
+    <p:extLst>
+      <p:ext uri="{BB962C8B-B14F-4D97-AF65-F5344CB8AC3E}">
+        <p14:creationId xmlns:p14="http://schemas.microsoft.com/office/powerpoint/2010/main" val="1816318279"/>
+      </p:ext>
+    </p:extLst>
   </p:cSld>
   <p:clrMapOvr>
     <a:masterClrMapping/>
@@ -1815,13 +1833,19 @@
         </p:spPr>
         <p:txBody>
           <a:bodyPr vert="eaVert"/>
-          <a:lstStyle/>
-          <a:p>
-            <a:r>
-              <a:rPr lang="en-CA" smtClean="0"/>
+          <a:lstStyle>
+            <a:lvl1pPr>
+              <a:defRPr>
+                <a:latin typeface="+mj-lt"/>
+              </a:defRPr>
+            </a:lvl1pPr>
+          </a:lstStyle>
+          <a:p>
+            <a:r>
+              <a:rPr lang="en-CA" dirty="0"/>
               <a:t>Click to edit Master title style</a:t>
             </a:r>
-            <a:endParaRPr lang="en-US"/>
+            <a:endParaRPr lang="en-US" dirty="0"/>
           </a:p>
         </p:txBody>
       </p:sp>
@@ -1843,125 +1867,132 @@
         </p:spPr>
         <p:txBody>
           <a:bodyPr vert="eaVert"/>
-          <a:lstStyle/>
+          <a:lstStyle>
+            <a:lvl1pPr>
+              <a:defRPr>
+                <a:latin typeface="+mn-lt"/>
+              </a:defRPr>
+            </a:lvl1pPr>
+            <a:lvl2pPr>
+              <a:defRPr>
+                <a:latin typeface="+mn-lt"/>
+              </a:defRPr>
+            </a:lvl2pPr>
+            <a:lvl3pPr>
+              <a:defRPr>
+                <a:latin typeface="+mn-lt"/>
+              </a:defRPr>
+            </a:lvl3pPr>
+            <a:lvl4pPr>
+              <a:defRPr>
+                <a:latin typeface="+mn-lt"/>
+              </a:defRPr>
+            </a:lvl4pPr>
+            <a:lvl5pPr>
+              <a:defRPr>
+                <a:latin typeface="+mn-lt"/>
+              </a:defRPr>
+            </a:lvl5pPr>
+          </a:lstStyle>
           <a:p>
             <a:pPr lvl="0"/>
             <a:r>
-              <a:rPr lang="en-CA" smtClean="0"/>
+              <a:rPr lang="en-CA" dirty="0"/>
               <a:t>Click to edit Master text styles</a:t>
             </a:r>
           </a:p>
           <a:p>
             <a:pPr lvl="1"/>
             <a:r>
-              <a:rPr lang="en-CA" smtClean="0"/>
+              <a:rPr lang="en-CA" dirty="0"/>
               <a:t>Second level</a:t>
             </a:r>
           </a:p>
           <a:p>
             <a:pPr lvl="2"/>
             <a:r>
-              <a:rPr lang="en-CA" smtClean="0"/>
+              <a:rPr lang="en-CA" dirty="0"/>
               <a:t>Third level</a:t>
             </a:r>
           </a:p>
           <a:p>
             <a:pPr lvl="3"/>
             <a:r>
-              <a:rPr lang="en-CA" smtClean="0"/>
+              <a:rPr lang="en-CA" dirty="0"/>
               <a:t>Fourth level</a:t>
             </a:r>
           </a:p>
           <a:p>
             <a:pPr lvl="4"/>
             <a:r>
-              <a:rPr lang="en-CA" smtClean="0"/>
+              <a:rPr lang="en-CA" dirty="0"/>
               <a:t>Fifth level</a:t>
             </a:r>
-            <a:endParaRPr lang="en-US"/>
+            <a:endParaRPr lang="en-US" dirty="0"/>
           </a:p>
         </p:txBody>
       </p:sp>
       <p:sp>
         <p:nvSpPr>
-          <p:cNvPr id="4" name="Date Placeholder 3"/>
+          <p:cNvPr id="7" name="Footer Placeholder 6">
+            <a:extLst>
+              <a:ext uri="{FF2B5EF4-FFF2-40B4-BE49-F238E27FC236}">
+                <a16:creationId xmlns:a16="http://schemas.microsoft.com/office/drawing/2014/main" id="{AB010344-6C51-EF4E-81B3-87005283EB16}"/>
+              </a:ext>
+            </a:extLst>
+          </p:cNvPr>
           <p:cNvSpPr>
             <a:spLocks noGrp="1"/>
           </p:cNvSpPr>
           <p:nvPr>
-            <p:ph type="dt" sz="half" idx="10"/>
+            <p:ph type="ftr" sz="quarter" idx="10"/>
           </p:nvPr>
         </p:nvSpPr>
         <p:spPr/>
         <p:txBody>
           <a:bodyPr/>
-          <a:lstStyle>
-            <a:lvl1pPr>
-              <a:defRPr smtClean="0"/>
-            </a:lvl1pPr>
-          </a:lstStyle>
-          <a:p>
-            <a:fld id="{B00C37A4-5AA0-6C4C-B4C1-05BACFD89896}" type="datetime1">
-              <a:rPr lang="en-US"/>
-              <a:pPr/>
-              <a:t>16-06-14</a:t>
-            </a:fld>
+          <a:lstStyle/>
+          <a:p>
             <a:endParaRPr lang="en-US"/>
           </a:p>
         </p:txBody>
       </p:sp>
       <p:sp>
         <p:nvSpPr>
-          <p:cNvPr id="5" name="Footer Placeholder 4"/>
+          <p:cNvPr id="8" name="Slide Number Placeholder 7">
+            <a:extLst>
+              <a:ext uri="{FF2B5EF4-FFF2-40B4-BE49-F238E27FC236}">
+                <a16:creationId xmlns:a16="http://schemas.microsoft.com/office/drawing/2014/main" id="{5ED49F94-3724-5E4A-B082-D0D7C38EC60C}"/>
+              </a:ext>
+            </a:extLst>
+          </p:cNvPr>
           <p:cNvSpPr>
             <a:spLocks noGrp="1"/>
           </p:cNvSpPr>
           <p:nvPr>
-            <p:ph type="ftr" sz="quarter" idx="11"/>
+            <p:ph type="sldNum" sz="quarter" idx="11"/>
           </p:nvPr>
         </p:nvSpPr>
         <p:spPr/>
         <p:txBody>
           <a:bodyPr/>
-          <a:lstStyle>
-            <a:lvl1pPr>
-              <a:defRPr/>
-            </a:lvl1pPr>
-          </a:lstStyle>
-          <a:p>
-            <a:endParaRPr lang="en-US"/>
-          </a:p>
-        </p:txBody>
-      </p:sp>
-      <p:sp>
-        <p:nvSpPr>
-          <p:cNvPr id="6" name="Slide Number Placeholder 5"/>
-          <p:cNvSpPr>
-            <a:spLocks noGrp="1"/>
-          </p:cNvSpPr>
-          <p:nvPr>
-            <p:ph type="sldNum" sz="quarter" idx="12"/>
-          </p:nvPr>
-        </p:nvSpPr>
-        <p:spPr/>
-        <p:txBody>
-          <a:bodyPr/>
-          <a:lstStyle>
-            <a:lvl1pPr>
-              <a:defRPr smtClean="0"/>
-            </a:lvl1pPr>
-          </a:lstStyle>
-          <a:p>
-            <a:fld id="{6CABA4D7-796B-7142-9403-B8CFED2F690C}" type="slidenum">
-              <a:rPr lang="en-US"/>
+          <a:lstStyle/>
+          <a:p>
+            <a:fld id="{95FC67CD-6733-D04F-B9BE-AD105949F24E}" type="slidenum">
+              <a:rPr lang="en-US" smtClean="0"/>
               <a:pPr/>
               <a:t>‹#›</a:t>
             </a:fld>
-            <a:endParaRPr lang="en-US"/>
+            <a:endParaRPr lang="en-US" dirty="0"/>
           </a:p>
         </p:txBody>
       </p:sp>
     </p:spTree>
+    <p:extLst>
+      <p:ext uri="{BB962C8B-B14F-4D97-AF65-F5344CB8AC3E}">
+        <p14:creationId xmlns:p14="http://schemas.microsoft.com/office/powerpoint/2010/main" val="2005722848"/>
+      </p:ext>
+    </p:extLst>
   </p:cSld>
   <p:clrMapOvr>
     <a:masterClrMapping/>
@@ -1999,13 +2030,19 @@
         <p:spPr/>
         <p:txBody>
           <a:bodyPr/>
-          <a:lstStyle/>
-          <a:p>
-            <a:r>
-              <a:rPr lang="en-CA" smtClean="0"/>
+          <a:lstStyle>
+            <a:lvl1pPr>
+              <a:defRPr>
+                <a:latin typeface="+mj-lt"/>
+              </a:defRPr>
+            </a:lvl1pPr>
+          </a:lstStyle>
+          <a:p>
+            <a:r>
+              <a:rPr lang="en-CA" dirty="0"/>
               <a:t>Click to edit Master title style</a:t>
             </a:r>
-            <a:endParaRPr lang="en-US"/>
+            <a:endParaRPr lang="en-US" dirty="0"/>
           </a:p>
         </p:txBody>
       </p:sp>
@@ -2022,53 +2059,110 @@
         <p:spPr/>
         <p:txBody>
           <a:bodyPr/>
-          <a:lstStyle/>
+          <a:lstStyle>
+            <a:lvl1pPr>
+              <a:defRPr>
+                <a:latin typeface="+mn-lt"/>
+              </a:defRPr>
+            </a:lvl1pPr>
+            <a:lvl2pPr>
+              <a:defRPr>
+                <a:latin typeface="+mn-lt"/>
+              </a:defRPr>
+            </a:lvl2pPr>
+            <a:lvl3pPr>
+              <a:defRPr>
+                <a:latin typeface="+mn-lt"/>
+              </a:defRPr>
+            </a:lvl3pPr>
+            <a:lvl4pPr>
+              <a:defRPr>
+                <a:latin typeface="+mn-lt"/>
+              </a:defRPr>
+            </a:lvl4pPr>
+            <a:lvl5pPr>
+              <a:defRPr>
+                <a:latin typeface="+mn-lt"/>
+              </a:defRPr>
+            </a:lvl5pPr>
+          </a:lstStyle>
           <a:p>
             <a:pPr lvl="0"/>
             <a:r>
-              <a:rPr lang="en-CA" smtClean="0"/>
+              <a:rPr lang="en-CA" dirty="0"/>
               <a:t>Click to edit Master text styles</a:t>
             </a:r>
           </a:p>
           <a:p>
             <a:pPr lvl="1"/>
             <a:r>
-              <a:rPr lang="en-CA" smtClean="0"/>
+              <a:rPr lang="en-CA" dirty="0"/>
               <a:t>Second level</a:t>
             </a:r>
           </a:p>
           <a:p>
             <a:pPr lvl="2"/>
             <a:r>
-              <a:rPr lang="en-CA" smtClean="0"/>
+              <a:rPr lang="en-CA" dirty="0"/>
               <a:t>Third level</a:t>
             </a:r>
           </a:p>
           <a:p>
             <a:pPr lvl="3"/>
             <a:r>
-              <a:rPr lang="en-CA" smtClean="0"/>
+              <a:rPr lang="en-CA" dirty="0"/>
               <a:t>Fourth level</a:t>
             </a:r>
           </a:p>
           <a:p>
             <a:pPr lvl="4"/>
             <a:r>
-              <a:rPr lang="en-CA" smtClean="0"/>
+              <a:rPr lang="en-CA" dirty="0"/>
               <a:t>Fifth level</a:t>
             </a:r>
-            <a:endParaRPr lang="en-US"/>
+            <a:endParaRPr lang="en-US" dirty="0"/>
           </a:p>
         </p:txBody>
       </p:sp>
       <p:sp>
         <p:nvSpPr>
-          <p:cNvPr id="4" name="Date Placeholder 3"/>
+          <p:cNvPr id="5" name="Footer Placeholder 4"/>
           <p:cNvSpPr>
             <a:spLocks noGrp="1"/>
           </p:cNvSpPr>
           <p:nvPr>
-            <p:ph type="dt" sz="half" idx="10"/>
+            <p:ph type="ftr" sz="quarter" idx="11"/>
+          </p:nvPr>
+        </p:nvSpPr>
+        <p:spPr>
+          <a:xfrm>
+            <a:off x="3124200" y="6248400"/>
+            <a:ext cx="2895600" cy="457200"/>
+          </a:xfrm>
+          <a:prstGeom prst="rect">
+            <a:avLst/>
+          </a:prstGeom>
+        </p:spPr>
+        <p:txBody>
+          <a:bodyPr/>
+          <a:lstStyle>
+            <a:lvl1pPr>
+              <a:defRPr/>
+            </a:lvl1pPr>
+          </a:lstStyle>
+          <a:p>
+            <a:endParaRPr lang="en-US"/>
+          </a:p>
+        </p:txBody>
+      </p:sp>
+      <p:sp>
+        <p:nvSpPr>
+          <p:cNvPr id="6" name="Slide Number Placeholder 5"/>
+          <p:cNvSpPr>
+            <a:spLocks noGrp="1"/>
+          </p:cNvSpPr>
+          <p:nvPr>
+            <p:ph type="sldNum" sz="quarter" idx="12"/>
           </p:nvPr>
         </p:nvSpPr>
         <p:spPr/>
@@ -2080,57 +2174,6 @@
             </a:lvl1pPr>
           </a:lstStyle>
           <a:p>
-            <a:fld id="{F668E4B5-49D5-B048-B5A5-3831D6A375F6}" type="datetime1">
-              <a:rPr lang="en-US"/>
-              <a:pPr/>
-              <a:t>16-06-14</a:t>
-            </a:fld>
-            <a:endParaRPr lang="en-US"/>
-          </a:p>
-        </p:txBody>
-      </p:sp>
-      <p:sp>
-        <p:nvSpPr>
-          <p:cNvPr id="5" name="Footer Placeholder 4"/>
-          <p:cNvSpPr>
-            <a:spLocks noGrp="1"/>
-          </p:cNvSpPr>
-          <p:nvPr>
-            <p:ph type="ftr" sz="quarter" idx="11"/>
-          </p:nvPr>
-        </p:nvSpPr>
-        <p:spPr/>
-        <p:txBody>
-          <a:bodyPr/>
-          <a:lstStyle>
-            <a:lvl1pPr>
-              <a:defRPr/>
-            </a:lvl1pPr>
-          </a:lstStyle>
-          <a:p>
-            <a:endParaRPr lang="en-US"/>
-          </a:p>
-        </p:txBody>
-      </p:sp>
-      <p:sp>
-        <p:nvSpPr>
-          <p:cNvPr id="6" name="Slide Number Placeholder 5"/>
-          <p:cNvSpPr>
-            <a:spLocks noGrp="1"/>
-          </p:cNvSpPr>
-          <p:nvPr>
-            <p:ph type="sldNum" sz="quarter" idx="12"/>
-          </p:nvPr>
-        </p:nvSpPr>
-        <p:spPr/>
-        <p:txBody>
-          <a:bodyPr/>
-          <a:lstStyle>
-            <a:lvl1pPr>
-              <a:defRPr smtClean="0"/>
-            </a:lvl1pPr>
-          </a:lstStyle>
-          <a:p>
             <a:fld id="{D94201BD-6681-B946-ACD9-A8F6D28AC38D}" type="slidenum">
               <a:rPr lang="en-US"/>
               <a:pPr/>
@@ -2141,6 +2184,11 @@
         </p:txBody>
       </p:sp>
     </p:spTree>
+    <p:extLst>
+      <p:ext uri="{BB962C8B-B14F-4D97-AF65-F5344CB8AC3E}">
+        <p14:creationId xmlns:p14="http://schemas.microsoft.com/office/powerpoint/2010/main" val="3278930555"/>
+      </p:ext>
+    </p:extLst>
   </p:cSld>
   <p:clrMapOvr>
     <a:masterClrMapping/>
@@ -2185,15 +2233,17 @@
           <a:bodyPr anchor="t"/>
           <a:lstStyle>
             <a:lvl1pPr algn="l">
-              <a:defRPr sz="4000" b="1" cap="all"/>
+              <a:defRPr sz="4000" b="1" cap="all">
+                <a:latin typeface="+mj-lt"/>
+              </a:defRPr>
             </a:lvl1pPr>
           </a:lstStyle>
           <a:p>
             <a:r>
-              <a:rPr lang="en-CA" smtClean="0"/>
+              <a:rPr lang="en-CA" dirty="0"/>
               <a:t>Click to edit Master title style</a:t>
             </a:r>
-            <a:endParaRPr lang="en-US"/>
+            <a:endParaRPr lang="en-US" dirty="0"/>
           </a:p>
         </p:txBody>
       </p:sp>
@@ -2218,7 +2268,9 @@
           <a:lstStyle>
             <a:lvl1pPr marL="0" indent="0">
               <a:buNone/>
-              <a:defRPr sz="2000"/>
+              <a:defRPr sz="2000">
+                <a:latin typeface="+mn-lt"/>
+              </a:defRPr>
             </a:lvl1pPr>
             <a:lvl2pPr marL="457200" indent="0">
               <a:buNone/>
@@ -2256,7 +2308,7 @@
           <a:p>
             <a:pPr lvl="0"/>
             <a:r>
-              <a:rPr lang="en-CA" smtClean="0"/>
+              <a:rPr lang="en-CA" dirty="0"/>
               <a:t>Click to edit Master text styles</a:t>
             </a:r>
           </a:p>
@@ -2264,84 +2316,65 @@
       </p:sp>
       <p:sp>
         <p:nvSpPr>
-          <p:cNvPr id="4" name="Date Placeholder 3"/>
+          <p:cNvPr id="7" name="Footer Placeholder 6">
+            <a:extLst>
+              <a:ext uri="{FF2B5EF4-FFF2-40B4-BE49-F238E27FC236}">
+                <a16:creationId xmlns:a16="http://schemas.microsoft.com/office/drawing/2014/main" id="{2B039AA2-523D-0546-920D-E32D1313510F}"/>
+              </a:ext>
+            </a:extLst>
+          </p:cNvPr>
           <p:cNvSpPr>
             <a:spLocks noGrp="1"/>
           </p:cNvSpPr>
           <p:nvPr>
-            <p:ph type="dt" sz="half" idx="10"/>
+            <p:ph type="ftr" sz="quarter" idx="10"/>
           </p:nvPr>
         </p:nvSpPr>
         <p:spPr/>
         <p:txBody>
           <a:bodyPr/>
-          <a:lstStyle>
-            <a:lvl1pPr>
-              <a:defRPr smtClean="0"/>
-            </a:lvl1pPr>
-          </a:lstStyle>
-          <a:p>
-            <a:fld id="{7ACDE087-5547-9146-A44C-F12479CD90F2}" type="datetime1">
-              <a:rPr lang="en-US"/>
-              <a:pPr/>
-              <a:t>16-06-14</a:t>
-            </a:fld>
+          <a:lstStyle/>
+          <a:p>
             <a:endParaRPr lang="en-US"/>
           </a:p>
         </p:txBody>
       </p:sp>
       <p:sp>
         <p:nvSpPr>
-          <p:cNvPr id="5" name="Footer Placeholder 4"/>
+          <p:cNvPr id="8" name="Slide Number Placeholder 7">
+            <a:extLst>
+              <a:ext uri="{FF2B5EF4-FFF2-40B4-BE49-F238E27FC236}">
+                <a16:creationId xmlns:a16="http://schemas.microsoft.com/office/drawing/2014/main" id="{F86BC01E-DD3B-5E4B-95A4-DD35BF84807C}"/>
+              </a:ext>
+            </a:extLst>
+          </p:cNvPr>
           <p:cNvSpPr>
             <a:spLocks noGrp="1"/>
           </p:cNvSpPr>
           <p:nvPr>
-            <p:ph type="ftr" sz="quarter" idx="11"/>
+            <p:ph type="sldNum" sz="quarter" idx="11"/>
           </p:nvPr>
         </p:nvSpPr>
         <p:spPr/>
         <p:txBody>
           <a:bodyPr/>
-          <a:lstStyle>
-            <a:lvl1pPr>
-              <a:defRPr/>
-            </a:lvl1pPr>
-          </a:lstStyle>
-          <a:p>
-            <a:endParaRPr lang="en-US"/>
-          </a:p>
-        </p:txBody>
-      </p:sp>
-      <p:sp>
-        <p:nvSpPr>
-          <p:cNvPr id="6" name="Slide Number Placeholder 5"/>
-          <p:cNvSpPr>
-            <a:spLocks noGrp="1"/>
-          </p:cNvSpPr>
-          <p:nvPr>
-            <p:ph type="sldNum" sz="quarter" idx="12"/>
-          </p:nvPr>
-        </p:nvSpPr>
-        <p:spPr/>
-        <p:txBody>
-          <a:bodyPr/>
-          <a:lstStyle>
-            <a:lvl1pPr>
-              <a:defRPr smtClean="0"/>
-            </a:lvl1pPr>
-          </a:lstStyle>
-          <a:p>
-            <a:fld id="{8758CC61-53BB-2C4B-8409-C0E64FC87BC4}" type="slidenum">
-              <a:rPr lang="en-US"/>
+          <a:lstStyle/>
+          <a:p>
+            <a:fld id="{95FC67CD-6733-D04F-B9BE-AD105949F24E}" type="slidenum">
+              <a:rPr lang="en-US" smtClean="0"/>
               <a:pPr/>
               <a:t>‹#›</a:t>
             </a:fld>
-            <a:endParaRPr lang="en-US"/>
+            <a:endParaRPr lang="en-US" dirty="0"/>
           </a:p>
         </p:txBody>
       </p:sp>
     </p:spTree>
+    <p:extLst>
+      <p:ext uri="{BB962C8B-B14F-4D97-AF65-F5344CB8AC3E}">
+        <p14:creationId xmlns:p14="http://schemas.microsoft.com/office/powerpoint/2010/main" val="2132605128"/>
+      </p:ext>
+    </p:extLst>
   </p:cSld>
   <p:clrMapOvr>
     <a:masterClrMapping/>
@@ -2379,13 +2412,19 @@
         <p:spPr/>
         <p:txBody>
           <a:bodyPr/>
-          <a:lstStyle/>
-          <a:p>
-            <a:r>
-              <a:rPr lang="en-CA" smtClean="0"/>
+          <a:lstStyle>
+            <a:lvl1pPr>
+              <a:defRPr>
+                <a:latin typeface="+mj-lt"/>
+              </a:defRPr>
+            </a:lvl1pPr>
+          </a:lstStyle>
+          <a:p>
+            <a:r>
+              <a:rPr lang="en-CA" dirty="0"/>
               <a:t>Click to edit Master title style</a:t>
             </a:r>
-            <a:endParaRPr lang="en-US"/>
+            <a:endParaRPr lang="en-US" dirty="0"/>
           </a:p>
         </p:txBody>
       </p:sp>
@@ -2409,19 +2448,29 @@
           <a:bodyPr/>
           <a:lstStyle>
             <a:lvl1pPr>
-              <a:defRPr sz="2800"/>
+              <a:defRPr sz="2800">
+                <a:latin typeface="+mn-lt"/>
+              </a:defRPr>
             </a:lvl1pPr>
             <a:lvl2pPr>
-              <a:defRPr sz="2400"/>
+              <a:defRPr sz="2400">
+                <a:latin typeface="+mn-lt"/>
+              </a:defRPr>
             </a:lvl2pPr>
             <a:lvl3pPr>
-              <a:defRPr sz="2000"/>
+              <a:defRPr sz="2000">
+                <a:latin typeface="+mn-lt"/>
+              </a:defRPr>
             </a:lvl3pPr>
             <a:lvl4pPr>
-              <a:defRPr sz="1800"/>
+              <a:defRPr sz="1800">
+                <a:latin typeface="+mn-lt"/>
+              </a:defRPr>
             </a:lvl4pPr>
             <a:lvl5pPr>
-              <a:defRPr sz="1800"/>
+              <a:defRPr sz="1800">
+                <a:latin typeface="+mn-lt"/>
+              </a:defRPr>
             </a:lvl5pPr>
             <a:lvl6pPr>
               <a:defRPr sz="1800"/>
@@ -2439,38 +2488,38 @@
           <a:p>
             <a:pPr lvl="0"/>
             <a:r>
-              <a:rPr lang="en-CA" smtClean="0"/>
+              <a:rPr lang="en-CA" dirty="0"/>
               <a:t>Click to edit Master text styles</a:t>
             </a:r>
           </a:p>
           <a:p>
             <a:pPr lvl="1"/>
             <a:r>
-              <a:rPr lang="en-CA" smtClean="0"/>
+              <a:rPr lang="en-CA" dirty="0"/>
               <a:t>Second level</a:t>
             </a:r>
           </a:p>
           <a:p>
             <a:pPr lvl="2"/>
             <a:r>
-              <a:rPr lang="en-CA" smtClean="0"/>
+              <a:rPr lang="en-CA" dirty="0"/>
               <a:t>Third level</a:t>
             </a:r>
           </a:p>
           <a:p>
             <a:pPr lvl="3"/>
             <a:r>
-              <a:rPr lang="en-CA" smtClean="0"/>
+              <a:rPr lang="en-CA" dirty="0"/>
               <a:t>Fourth level</a:t>
             </a:r>
           </a:p>
           <a:p>
             <a:pPr lvl="4"/>
             <a:r>
-              <a:rPr lang="en-CA" smtClean="0"/>
+              <a:rPr lang="en-CA" dirty="0"/>
               <a:t>Fifth level</a:t>
             </a:r>
-            <a:endParaRPr lang="en-US"/>
+            <a:endParaRPr lang="en-US" dirty="0"/>
           </a:p>
         </p:txBody>
       </p:sp>
@@ -2494,19 +2543,29 @@
           <a:bodyPr/>
           <a:lstStyle>
             <a:lvl1pPr>
-              <a:defRPr sz="2800"/>
+              <a:defRPr sz="2800">
+                <a:latin typeface="+mn-lt"/>
+              </a:defRPr>
             </a:lvl1pPr>
             <a:lvl2pPr>
-              <a:defRPr sz="2400"/>
+              <a:defRPr sz="2400">
+                <a:latin typeface="+mn-lt"/>
+              </a:defRPr>
             </a:lvl2pPr>
             <a:lvl3pPr>
-              <a:defRPr sz="2000"/>
+              <a:defRPr sz="2000">
+                <a:latin typeface="+mn-lt"/>
+              </a:defRPr>
             </a:lvl3pPr>
             <a:lvl4pPr>
-              <a:defRPr sz="1800"/>
+              <a:defRPr sz="1800">
+                <a:latin typeface="+mn-lt"/>
+              </a:defRPr>
             </a:lvl4pPr>
             <a:lvl5pPr>
-              <a:defRPr sz="1800"/>
+              <a:defRPr sz="1800">
+                <a:latin typeface="+mn-lt"/>
+              </a:defRPr>
             </a:lvl5pPr>
             <a:lvl6pPr>
               <a:defRPr sz="1800"/>
@@ -2524,121 +2583,102 @@
           <a:p>
             <a:pPr lvl="0"/>
             <a:r>
-              <a:rPr lang="en-CA" smtClean="0"/>
+              <a:rPr lang="en-CA" dirty="0"/>
               <a:t>Click to edit Master text styles</a:t>
             </a:r>
           </a:p>
           <a:p>
             <a:pPr lvl="1"/>
             <a:r>
-              <a:rPr lang="en-CA" smtClean="0"/>
+              <a:rPr lang="en-CA" dirty="0"/>
               <a:t>Second level</a:t>
             </a:r>
           </a:p>
           <a:p>
             <a:pPr lvl="2"/>
             <a:r>
-              <a:rPr lang="en-CA" smtClean="0"/>
+              <a:rPr lang="en-CA" dirty="0"/>
               <a:t>Third level</a:t>
             </a:r>
           </a:p>
           <a:p>
             <a:pPr lvl="3"/>
             <a:r>
-              <a:rPr lang="en-CA" smtClean="0"/>
+              <a:rPr lang="en-CA" dirty="0"/>
               <a:t>Fourth level</a:t>
             </a:r>
           </a:p>
           <a:p>
             <a:pPr lvl="4"/>
             <a:r>
-              <a:rPr lang="en-CA" smtClean="0"/>
+              <a:rPr lang="en-CA" dirty="0"/>
               <a:t>Fifth level</a:t>
             </a:r>
-            <a:endParaRPr lang="en-US"/>
+            <a:endParaRPr lang="en-US" dirty="0"/>
           </a:p>
         </p:txBody>
       </p:sp>
       <p:sp>
         <p:nvSpPr>
-          <p:cNvPr id="5" name="Date Placeholder 4"/>
+          <p:cNvPr id="8" name="Footer Placeholder 7">
+            <a:extLst>
+              <a:ext uri="{FF2B5EF4-FFF2-40B4-BE49-F238E27FC236}">
+                <a16:creationId xmlns:a16="http://schemas.microsoft.com/office/drawing/2014/main" id="{DA945EC4-37BF-4E43-B2AD-837601045EC0}"/>
+              </a:ext>
+            </a:extLst>
+          </p:cNvPr>
           <p:cNvSpPr>
             <a:spLocks noGrp="1"/>
           </p:cNvSpPr>
           <p:nvPr>
-            <p:ph type="dt" sz="half" idx="10"/>
+            <p:ph type="ftr" sz="quarter" idx="10"/>
           </p:nvPr>
         </p:nvSpPr>
         <p:spPr/>
         <p:txBody>
           <a:bodyPr/>
-          <a:lstStyle>
-            <a:lvl1pPr>
-              <a:defRPr smtClean="0"/>
-            </a:lvl1pPr>
-          </a:lstStyle>
-          <a:p>
-            <a:fld id="{ABC23590-A601-0D4E-8E81-4963D950E64C}" type="datetime1">
-              <a:rPr lang="en-US"/>
-              <a:pPr/>
-              <a:t>16-06-14</a:t>
-            </a:fld>
+          <a:lstStyle/>
+          <a:p>
             <a:endParaRPr lang="en-US"/>
           </a:p>
         </p:txBody>
       </p:sp>
       <p:sp>
         <p:nvSpPr>
-          <p:cNvPr id="6" name="Footer Placeholder 5"/>
+          <p:cNvPr id="9" name="Slide Number Placeholder 8">
+            <a:extLst>
+              <a:ext uri="{FF2B5EF4-FFF2-40B4-BE49-F238E27FC236}">
+                <a16:creationId xmlns:a16="http://schemas.microsoft.com/office/drawing/2014/main" id="{BEFEF4CF-D098-9549-A3AC-4A120E0BFA05}"/>
+              </a:ext>
+            </a:extLst>
+          </p:cNvPr>
           <p:cNvSpPr>
             <a:spLocks noGrp="1"/>
           </p:cNvSpPr>
           <p:nvPr>
-            <p:ph type="ftr" sz="quarter" idx="11"/>
+            <p:ph type="sldNum" sz="quarter" idx="11"/>
           </p:nvPr>
         </p:nvSpPr>
         <p:spPr/>
         <p:txBody>
           <a:bodyPr/>
-          <a:lstStyle>
-            <a:lvl1pPr>
-              <a:defRPr/>
-            </a:lvl1pPr>
-          </a:lstStyle>
-          <a:p>
-            <a:endParaRPr lang="en-US"/>
-          </a:p>
-        </p:txBody>
-      </p:sp>
-      <p:sp>
-        <p:nvSpPr>
-          <p:cNvPr id="7" name="Slide Number Placeholder 6"/>
-          <p:cNvSpPr>
-            <a:spLocks noGrp="1"/>
-          </p:cNvSpPr>
-          <p:nvPr>
-            <p:ph type="sldNum" sz="quarter" idx="12"/>
-          </p:nvPr>
-        </p:nvSpPr>
-        <p:spPr/>
-        <p:txBody>
-          <a:bodyPr/>
-          <a:lstStyle>
-            <a:lvl1pPr>
-              <a:defRPr smtClean="0"/>
-            </a:lvl1pPr>
-          </a:lstStyle>
-          <a:p>
-            <a:fld id="{EBE41845-A0ED-8C47-8151-7C5D338656CB}" type="slidenum">
-              <a:rPr lang="en-US"/>
+          <a:lstStyle/>
+          <a:p>
+            <a:fld id="{95FC67CD-6733-D04F-B9BE-AD105949F24E}" type="slidenum">
+              <a:rPr lang="en-US" smtClean="0"/>
               <a:pPr/>
               <a:t>‹#›</a:t>
             </a:fld>
-            <a:endParaRPr lang="en-US"/>
+            <a:endParaRPr lang="en-US" dirty="0"/>
           </a:p>
         </p:txBody>
       </p:sp>
     </p:spTree>
+    <p:extLst>
+      <p:ext uri="{BB962C8B-B14F-4D97-AF65-F5344CB8AC3E}">
+        <p14:creationId xmlns:p14="http://schemas.microsoft.com/office/powerpoint/2010/main" val="1147678225"/>
+      </p:ext>
+    </p:extLst>
   </p:cSld>
   <p:clrMapOvr>
     <a:masterClrMapping/>
@@ -2683,15 +2723,17 @@
           <a:bodyPr/>
           <a:lstStyle>
             <a:lvl1pPr>
-              <a:defRPr/>
+              <a:defRPr>
+                <a:latin typeface="+mj-lt"/>
+              </a:defRPr>
             </a:lvl1pPr>
           </a:lstStyle>
           <a:p>
             <a:r>
-              <a:rPr lang="en-CA" smtClean="0"/>
+              <a:rPr lang="en-CA" dirty="0"/>
               <a:t>Click to edit Master title style</a:t>
             </a:r>
-            <a:endParaRPr lang="en-US"/>
+            <a:endParaRPr lang="en-US" dirty="0"/>
           </a:p>
         </p:txBody>
       </p:sp>
@@ -2716,7 +2758,9 @@
           <a:lstStyle>
             <a:lvl1pPr marL="0" indent="0">
               <a:buNone/>
-              <a:defRPr sz="2400" b="1"/>
+              <a:defRPr sz="2400" b="1">
+                <a:latin typeface="+mj-lt"/>
+              </a:defRPr>
             </a:lvl1pPr>
             <a:lvl2pPr marL="457200" indent="0">
               <a:buNone/>
@@ -2754,7 +2798,7 @@
           <a:p>
             <a:pPr lvl="0"/>
             <a:r>
-              <a:rPr lang="en-CA" smtClean="0"/>
+              <a:rPr lang="en-CA" dirty="0"/>
               <a:t>Click to edit Master text styles</a:t>
             </a:r>
           </a:p>
@@ -2780,19 +2824,29 @@
           <a:bodyPr/>
           <a:lstStyle>
             <a:lvl1pPr>
-              <a:defRPr sz="2400"/>
+              <a:defRPr sz="2400">
+                <a:latin typeface="+mn-lt"/>
+              </a:defRPr>
             </a:lvl1pPr>
             <a:lvl2pPr>
-              <a:defRPr sz="2000"/>
+              <a:defRPr sz="2000">
+                <a:latin typeface="+mn-lt"/>
+              </a:defRPr>
             </a:lvl2pPr>
             <a:lvl3pPr>
-              <a:defRPr sz="1800"/>
+              <a:defRPr sz="1800">
+                <a:latin typeface="+mn-lt"/>
+              </a:defRPr>
             </a:lvl3pPr>
             <a:lvl4pPr>
-              <a:defRPr sz="1600"/>
+              <a:defRPr sz="1600">
+                <a:latin typeface="+mn-lt"/>
+              </a:defRPr>
             </a:lvl4pPr>
             <a:lvl5pPr>
-              <a:defRPr sz="1600"/>
+              <a:defRPr sz="1600">
+                <a:latin typeface="+mn-lt"/>
+              </a:defRPr>
             </a:lvl5pPr>
             <a:lvl6pPr>
               <a:defRPr sz="1600"/>
@@ -2810,38 +2864,38 @@
           <a:p>
             <a:pPr lvl="0"/>
             <a:r>
-              <a:rPr lang="en-CA" smtClean="0"/>
+              <a:rPr lang="en-CA" dirty="0"/>
               <a:t>Click to edit Master text styles</a:t>
             </a:r>
           </a:p>
           <a:p>
             <a:pPr lvl="1"/>
             <a:r>
-              <a:rPr lang="en-CA" smtClean="0"/>
+              <a:rPr lang="en-CA" dirty="0"/>
               <a:t>Second level</a:t>
             </a:r>
           </a:p>
           <a:p>
             <a:pPr lvl="2"/>
             <a:r>
-              <a:rPr lang="en-CA" smtClean="0"/>
+              <a:rPr lang="en-CA" dirty="0"/>
               <a:t>Third level</a:t>
             </a:r>
           </a:p>
           <a:p>
             <a:pPr lvl="3"/>
             <a:r>
-              <a:rPr lang="en-CA" smtClean="0"/>
+              <a:rPr lang="en-CA" dirty="0"/>
               <a:t>Fourth level</a:t>
             </a:r>
           </a:p>
           <a:p>
             <a:pPr lvl="4"/>
             <a:r>
-              <a:rPr lang="en-CA" smtClean="0"/>
+              <a:rPr lang="en-CA" dirty="0"/>
               <a:t>Fifth level</a:t>
             </a:r>
-            <a:endParaRPr lang="en-US"/>
+            <a:endParaRPr lang="en-US" dirty="0"/>
           </a:p>
         </p:txBody>
       </p:sp>
@@ -2866,7 +2920,9 @@
           <a:lstStyle>
             <a:lvl1pPr marL="0" indent="0">
               <a:buNone/>
-              <a:defRPr sz="2400" b="1"/>
+              <a:defRPr sz="2400" b="1">
+                <a:latin typeface="+mj-lt"/>
+              </a:defRPr>
             </a:lvl1pPr>
             <a:lvl2pPr marL="457200" indent="0">
               <a:buNone/>
@@ -2904,7 +2960,7 @@
           <a:p>
             <a:pPr lvl="0"/>
             <a:r>
-              <a:rPr lang="en-CA" smtClean="0"/>
+              <a:rPr lang="en-CA" dirty="0"/>
               <a:t>Click to edit Master text styles</a:t>
             </a:r>
           </a:p>
@@ -2930,19 +2986,29 @@
           <a:bodyPr/>
           <a:lstStyle>
             <a:lvl1pPr>
-              <a:defRPr sz="2400"/>
+              <a:defRPr sz="2400">
+                <a:latin typeface="+mn-lt"/>
+              </a:defRPr>
             </a:lvl1pPr>
             <a:lvl2pPr>
-              <a:defRPr sz="2000"/>
+              <a:defRPr sz="2000">
+                <a:latin typeface="+mn-lt"/>
+              </a:defRPr>
             </a:lvl2pPr>
             <a:lvl3pPr>
-              <a:defRPr sz="1800"/>
+              <a:defRPr sz="1800">
+                <a:latin typeface="+mn-lt"/>
+              </a:defRPr>
             </a:lvl3pPr>
             <a:lvl4pPr>
-              <a:defRPr sz="1600"/>
+              <a:defRPr sz="1600">
+                <a:latin typeface="+mn-lt"/>
+              </a:defRPr>
             </a:lvl4pPr>
             <a:lvl5pPr>
-              <a:defRPr sz="1600"/>
+              <a:defRPr sz="1600">
+                <a:latin typeface="+mn-lt"/>
+              </a:defRPr>
             </a:lvl5pPr>
             <a:lvl6pPr>
               <a:defRPr sz="1600"/>
@@ -2960,121 +3026,102 @@
           <a:p>
             <a:pPr lvl="0"/>
             <a:r>
-              <a:rPr lang="en-CA" smtClean="0"/>
+              <a:rPr lang="en-CA" dirty="0"/>
               <a:t>Click to edit Master text styles</a:t>
             </a:r>
           </a:p>
           <a:p>
             <a:pPr lvl="1"/>
             <a:r>
-              <a:rPr lang="en-CA" smtClean="0"/>
+              <a:rPr lang="en-CA" dirty="0"/>
               <a:t>Second level</a:t>
             </a:r>
           </a:p>
           <a:p>
             <a:pPr lvl="2"/>
             <a:r>
-              <a:rPr lang="en-CA" smtClean="0"/>
+              <a:rPr lang="en-CA" dirty="0"/>
               <a:t>Third level</a:t>
             </a:r>
           </a:p>
           <a:p>
             <a:pPr lvl="3"/>
             <a:r>
-              <a:rPr lang="en-CA" smtClean="0"/>
+              <a:rPr lang="en-CA" dirty="0"/>
               <a:t>Fourth level</a:t>
             </a:r>
           </a:p>
           <a:p>
             <a:pPr lvl="4"/>
             <a:r>
-              <a:rPr lang="en-CA" smtClean="0"/>
+              <a:rPr lang="en-CA" dirty="0"/>
               <a:t>Fifth level</a:t>
             </a:r>
-            <a:endParaRPr lang="en-US"/>
+            <a:endParaRPr lang="en-US" dirty="0"/>
           </a:p>
         </p:txBody>
       </p:sp>
       <p:sp>
         <p:nvSpPr>
-          <p:cNvPr id="7" name="Date Placeholder 6"/>
+          <p:cNvPr id="10" name="Footer Placeholder 9">
+            <a:extLst>
+              <a:ext uri="{FF2B5EF4-FFF2-40B4-BE49-F238E27FC236}">
+                <a16:creationId xmlns:a16="http://schemas.microsoft.com/office/drawing/2014/main" id="{0912E499-92DE-AB4A-A5B0-FD67B2273F7D}"/>
+              </a:ext>
+            </a:extLst>
+          </p:cNvPr>
           <p:cNvSpPr>
             <a:spLocks noGrp="1"/>
           </p:cNvSpPr>
           <p:nvPr>
-            <p:ph type="dt" sz="half" idx="10"/>
+            <p:ph type="ftr" sz="quarter" idx="10"/>
           </p:nvPr>
         </p:nvSpPr>
         <p:spPr/>
         <p:txBody>
           <a:bodyPr/>
-          <a:lstStyle>
-            <a:lvl1pPr>
-              <a:defRPr smtClean="0"/>
-            </a:lvl1pPr>
-          </a:lstStyle>
-          <a:p>
-            <a:fld id="{F80D6EEA-C880-B74F-9033-821B2613D0DA}" type="datetime1">
-              <a:rPr lang="en-US"/>
-              <a:pPr/>
-              <a:t>16-06-14</a:t>
-            </a:fld>
+          <a:lstStyle/>
+          <a:p>
             <a:endParaRPr lang="en-US"/>
           </a:p>
         </p:txBody>
       </p:sp>
       <p:sp>
         <p:nvSpPr>
-          <p:cNvPr id="8" name="Footer Placeholder 7"/>
+          <p:cNvPr id="11" name="Slide Number Placeholder 10">
+            <a:extLst>
+              <a:ext uri="{FF2B5EF4-FFF2-40B4-BE49-F238E27FC236}">
+                <a16:creationId xmlns:a16="http://schemas.microsoft.com/office/drawing/2014/main" id="{80D4789F-B319-FB45-8996-99D418A3599C}"/>
+              </a:ext>
+            </a:extLst>
+          </p:cNvPr>
           <p:cNvSpPr>
             <a:spLocks noGrp="1"/>
           </p:cNvSpPr>
           <p:nvPr>
-            <p:ph type="ftr" sz="quarter" idx="11"/>
+            <p:ph type="sldNum" sz="quarter" idx="11"/>
           </p:nvPr>
         </p:nvSpPr>
         <p:spPr/>
         <p:txBody>
           <a:bodyPr/>
-          <a:lstStyle>
-            <a:lvl1pPr>
-              <a:defRPr/>
-            </a:lvl1pPr>
-          </a:lstStyle>
-          <a:p>
-            <a:endParaRPr lang="en-US"/>
-          </a:p>
-        </p:txBody>
-      </p:sp>
-      <p:sp>
-        <p:nvSpPr>
-          <p:cNvPr id="9" name="Slide Number Placeholder 8"/>
-          <p:cNvSpPr>
-            <a:spLocks noGrp="1"/>
-          </p:cNvSpPr>
-          <p:nvPr>
-            <p:ph type="sldNum" sz="quarter" idx="12"/>
-          </p:nvPr>
-        </p:nvSpPr>
-        <p:spPr/>
-        <p:txBody>
-          <a:bodyPr/>
-          <a:lstStyle>
-            <a:lvl1pPr>
-              <a:defRPr smtClean="0"/>
-            </a:lvl1pPr>
-          </a:lstStyle>
-          <a:p>
-            <a:fld id="{F4EC5820-8441-A146-B000-5F140F8358A8}" type="slidenum">
-              <a:rPr lang="en-US"/>
+          <a:lstStyle/>
+          <a:p>
+            <a:fld id="{95FC67CD-6733-D04F-B9BE-AD105949F24E}" type="slidenum">
+              <a:rPr lang="en-US" smtClean="0"/>
               <a:pPr/>
               <a:t>‹#›</a:t>
             </a:fld>
-            <a:endParaRPr lang="en-US"/>
+            <a:endParaRPr lang="en-US" dirty="0"/>
           </a:p>
         </p:txBody>
       </p:sp>
     </p:spTree>
+    <p:extLst>
+      <p:ext uri="{BB962C8B-B14F-4D97-AF65-F5344CB8AC3E}">
+        <p14:creationId xmlns:p14="http://schemas.microsoft.com/office/powerpoint/2010/main" val="1916835626"/>
+      </p:ext>
+    </p:extLst>
   </p:cSld>
   <p:clrMapOvr>
     <a:masterClrMapping/>
@@ -3112,96 +3159,83 @@
         <p:spPr/>
         <p:txBody>
           <a:bodyPr/>
-          <a:lstStyle/>
-          <a:p>
-            <a:r>
-              <a:rPr lang="en-CA" smtClean="0"/>
+          <a:lstStyle>
+            <a:lvl1pPr>
+              <a:defRPr>
+                <a:latin typeface="+mj-lt"/>
+              </a:defRPr>
+            </a:lvl1pPr>
+          </a:lstStyle>
+          <a:p>
+            <a:r>
+              <a:rPr lang="en-CA" dirty="0"/>
               <a:t>Click to edit Master title style</a:t>
             </a:r>
-            <a:endParaRPr lang="en-US"/>
+            <a:endParaRPr lang="en-US" dirty="0"/>
           </a:p>
         </p:txBody>
       </p:sp>
       <p:sp>
         <p:nvSpPr>
-          <p:cNvPr id="3" name="Date Placeholder 2"/>
+          <p:cNvPr id="6" name="Footer Placeholder 5">
+            <a:extLst>
+              <a:ext uri="{FF2B5EF4-FFF2-40B4-BE49-F238E27FC236}">
+                <a16:creationId xmlns:a16="http://schemas.microsoft.com/office/drawing/2014/main" id="{96BDBB7E-298A-4445-97E1-4B099A07ED3A}"/>
+              </a:ext>
+            </a:extLst>
+          </p:cNvPr>
           <p:cNvSpPr>
             <a:spLocks noGrp="1"/>
           </p:cNvSpPr>
           <p:nvPr>
-            <p:ph type="dt" sz="half" idx="10"/>
+            <p:ph type="ftr" sz="quarter" idx="10"/>
           </p:nvPr>
         </p:nvSpPr>
         <p:spPr/>
         <p:txBody>
           <a:bodyPr/>
-          <a:lstStyle>
-            <a:lvl1pPr>
-              <a:defRPr smtClean="0"/>
-            </a:lvl1pPr>
-          </a:lstStyle>
-          <a:p>
-            <a:fld id="{D67FB90A-5A86-AA47-9DF5-D4B51CBF5733}" type="datetime1">
-              <a:rPr lang="en-US"/>
-              <a:pPr/>
-              <a:t>16-06-14</a:t>
-            </a:fld>
+          <a:lstStyle/>
+          <a:p>
             <a:endParaRPr lang="en-US"/>
           </a:p>
         </p:txBody>
       </p:sp>
       <p:sp>
         <p:nvSpPr>
-          <p:cNvPr id="4" name="Footer Placeholder 3"/>
+          <p:cNvPr id="7" name="Slide Number Placeholder 6">
+            <a:extLst>
+              <a:ext uri="{FF2B5EF4-FFF2-40B4-BE49-F238E27FC236}">
+                <a16:creationId xmlns:a16="http://schemas.microsoft.com/office/drawing/2014/main" id="{A7895EC8-D916-8648-B520-23F9FC802EB0}"/>
+              </a:ext>
+            </a:extLst>
+          </p:cNvPr>
           <p:cNvSpPr>
             <a:spLocks noGrp="1"/>
           </p:cNvSpPr>
           <p:nvPr>
-            <p:ph type="ftr" sz="quarter" idx="11"/>
+            <p:ph type="sldNum" sz="quarter" idx="11"/>
           </p:nvPr>
         </p:nvSpPr>
         <p:spPr/>
         <p:txBody>
           <a:bodyPr/>
-          <a:lstStyle>
-            <a:lvl1pPr>
-              <a:defRPr/>
-            </a:lvl1pPr>
-          </a:lstStyle>
-          <a:p>
-            <a:endParaRPr lang="en-US"/>
-          </a:p>
-        </p:txBody>
-      </p:sp>
-      <p:sp>
-        <p:nvSpPr>
-          <p:cNvPr id="5" name="Slide Number Placeholder 4"/>
-          <p:cNvSpPr>
-            <a:spLocks noGrp="1"/>
-          </p:cNvSpPr>
-          <p:nvPr>
-            <p:ph type="sldNum" sz="quarter" idx="12"/>
-          </p:nvPr>
-        </p:nvSpPr>
-        <p:spPr/>
-        <p:txBody>
-          <a:bodyPr/>
-          <a:lstStyle>
-            <a:lvl1pPr>
-              <a:defRPr smtClean="0"/>
-            </a:lvl1pPr>
-          </a:lstStyle>
-          <a:p>
-            <a:fld id="{44E1A620-A552-4548-BA5D-0021EC56C380}" type="slidenum">
-              <a:rPr lang="en-US"/>
+          <a:lstStyle/>
+          <a:p>
+            <a:fld id="{95FC67CD-6733-D04F-B9BE-AD105949F24E}" type="slidenum">
+              <a:rPr lang="en-US" smtClean="0"/>
               <a:pPr/>
               <a:t>‹#›</a:t>
             </a:fld>
-            <a:endParaRPr lang="en-US"/>
+            <a:endParaRPr lang="en-US" dirty="0"/>
           </a:p>
         </p:txBody>
       </p:sp>
     </p:spTree>
+    <p:extLst>
+      <p:ext uri="{BB962C8B-B14F-4D97-AF65-F5344CB8AC3E}">
+        <p14:creationId xmlns:p14="http://schemas.microsoft.com/office/powerpoint/2010/main" val="614612234"/>
+      </p:ext>
+    </p:extLst>
   </p:cSld>
   <p:clrMapOvr>
     <a:masterClrMapping/>
@@ -3228,84 +3262,65 @@
       </p:grpSpPr>
       <p:sp>
         <p:nvSpPr>
-          <p:cNvPr id="2" name="Date Placeholder 1"/>
+          <p:cNvPr id="5" name="Footer Placeholder 4">
+            <a:extLst>
+              <a:ext uri="{FF2B5EF4-FFF2-40B4-BE49-F238E27FC236}">
+                <a16:creationId xmlns:a16="http://schemas.microsoft.com/office/drawing/2014/main" id="{5DF03754-C429-BF4B-85C9-F1D1C975E80F}"/>
+              </a:ext>
+            </a:extLst>
+          </p:cNvPr>
           <p:cNvSpPr>
             <a:spLocks noGrp="1"/>
           </p:cNvSpPr>
           <p:nvPr>
-            <p:ph type="dt" sz="half" idx="10"/>
+            <p:ph type="ftr" sz="quarter" idx="10"/>
           </p:nvPr>
         </p:nvSpPr>
         <p:spPr/>
         <p:txBody>
           <a:bodyPr/>
-          <a:lstStyle>
-            <a:lvl1pPr>
-              <a:defRPr smtClean="0"/>
-            </a:lvl1pPr>
-          </a:lstStyle>
-          <a:p>
-            <a:fld id="{19D5CE67-D7FF-1A43-B8C8-8AC2D455325E}" type="datetime1">
-              <a:rPr lang="en-US"/>
-              <a:pPr/>
-              <a:t>16-06-14</a:t>
-            </a:fld>
+          <a:lstStyle/>
+          <a:p>
             <a:endParaRPr lang="en-US"/>
           </a:p>
         </p:txBody>
       </p:sp>
       <p:sp>
         <p:nvSpPr>
-          <p:cNvPr id="3" name="Footer Placeholder 2"/>
+          <p:cNvPr id="6" name="Slide Number Placeholder 5">
+            <a:extLst>
+              <a:ext uri="{FF2B5EF4-FFF2-40B4-BE49-F238E27FC236}">
+                <a16:creationId xmlns:a16="http://schemas.microsoft.com/office/drawing/2014/main" id="{53E846D2-4831-1148-91F0-086A1F9C711D}"/>
+              </a:ext>
+            </a:extLst>
+          </p:cNvPr>
           <p:cNvSpPr>
             <a:spLocks noGrp="1"/>
           </p:cNvSpPr>
           <p:nvPr>
-            <p:ph type="ftr" sz="quarter" idx="11"/>
+            <p:ph type="sldNum" sz="quarter" idx="11"/>
           </p:nvPr>
         </p:nvSpPr>
         <p:spPr/>
         <p:txBody>
           <a:bodyPr/>
-          <a:lstStyle>
-            <a:lvl1pPr>
-              <a:defRPr/>
-            </a:lvl1pPr>
-          </a:lstStyle>
-          <a:p>
-            <a:endParaRPr lang="en-US"/>
-          </a:p>
-        </p:txBody>
-      </p:sp>
-      <p:sp>
-        <p:nvSpPr>
-          <p:cNvPr id="4" name="Slide Number Placeholder 3"/>
-          <p:cNvSpPr>
-            <a:spLocks noGrp="1"/>
-          </p:cNvSpPr>
-          <p:nvPr>
-            <p:ph type="sldNum" sz="quarter" idx="12"/>
-          </p:nvPr>
-        </p:nvSpPr>
-        <p:spPr/>
-        <p:txBody>
-          <a:bodyPr/>
-          <a:lstStyle>
-            <a:lvl1pPr>
-              <a:defRPr smtClean="0"/>
-            </a:lvl1pPr>
-          </a:lstStyle>
-          <a:p>
-            <a:fld id="{5EB2D152-C363-5940-8B1F-9B69647D8BB3}" type="slidenum">
-              <a:rPr lang="en-US"/>
+          <a:lstStyle/>
+          <a:p>
+            <a:fld id="{95FC67CD-6733-D04F-B9BE-AD105949F24E}" type="slidenum">
+              <a:rPr lang="en-US" smtClean="0"/>
               <a:pPr/>
               <a:t>‹#›</a:t>
             </a:fld>
-            <a:endParaRPr lang="en-US"/>
+            <a:endParaRPr lang="en-US" dirty="0"/>
           </a:p>
         </p:txBody>
       </p:sp>
     </p:spTree>
+    <p:extLst>
+      <p:ext uri="{BB962C8B-B14F-4D97-AF65-F5344CB8AC3E}">
+        <p14:creationId xmlns:p14="http://schemas.microsoft.com/office/powerpoint/2010/main" val="1886813576"/>
+      </p:ext>
+    </p:extLst>
   </p:cSld>
   <p:clrMapOvr>
     <a:masterClrMapping/>
@@ -3350,15 +3365,17 @@
           <a:bodyPr anchor="b"/>
           <a:lstStyle>
             <a:lvl1pPr algn="l">
-              <a:defRPr sz="2000" b="1"/>
+              <a:defRPr sz="2000" b="1">
+                <a:latin typeface="+mj-lt"/>
+              </a:defRPr>
             </a:lvl1pPr>
           </a:lstStyle>
           <a:p>
             <a:r>
-              <a:rPr lang="en-CA" smtClean="0"/>
+              <a:rPr lang="en-CA" dirty="0"/>
               <a:t>Click to edit Master title style</a:t>
             </a:r>
-            <a:endParaRPr lang="en-US"/>
+            <a:endParaRPr lang="en-US" dirty="0"/>
           </a:p>
         </p:txBody>
       </p:sp>
@@ -3382,19 +3399,29 @@
           <a:bodyPr/>
           <a:lstStyle>
             <a:lvl1pPr>
-              <a:defRPr sz="3200"/>
+              <a:defRPr sz="3200">
+                <a:latin typeface="+mn-lt"/>
+              </a:defRPr>
             </a:lvl1pPr>
             <a:lvl2pPr>
-              <a:defRPr sz="2800"/>
+              <a:defRPr sz="2800">
+                <a:latin typeface="+mn-lt"/>
+              </a:defRPr>
             </a:lvl2pPr>
             <a:lvl3pPr>
-              <a:defRPr sz="2400"/>
+              <a:defRPr sz="2400">
+                <a:latin typeface="+mn-lt"/>
+              </a:defRPr>
             </a:lvl3pPr>
             <a:lvl4pPr>
-              <a:defRPr sz="2000"/>
+              <a:defRPr sz="2000">
+                <a:latin typeface="+mn-lt"/>
+              </a:defRPr>
             </a:lvl4pPr>
             <a:lvl5pPr>
-              <a:defRPr sz="2000"/>
+              <a:defRPr sz="2000">
+                <a:latin typeface="+mn-lt"/>
+              </a:defRPr>
             </a:lvl5pPr>
             <a:lvl6pPr>
               <a:defRPr sz="2000"/>
@@ -3412,38 +3439,38 @@
           <a:p>
             <a:pPr lvl="0"/>
             <a:r>
-              <a:rPr lang="en-CA" smtClean="0"/>
+              <a:rPr lang="en-CA" dirty="0"/>
               <a:t>Click to edit Master text styles</a:t>
             </a:r>
           </a:p>
           <a:p>
             <a:pPr lvl="1"/>
             <a:r>
-              <a:rPr lang="en-CA" smtClean="0"/>
+              <a:rPr lang="en-CA" dirty="0"/>
               <a:t>Second level</a:t>
             </a:r>
           </a:p>
           <a:p>
             <a:pPr lvl="2"/>
             <a:r>
-              <a:rPr lang="en-CA" smtClean="0"/>
+              <a:rPr lang="en-CA" dirty="0"/>
               <a:t>Third level</a:t>
             </a:r>
           </a:p>
           <a:p>
             <a:pPr lvl="3"/>
             <a:r>
-              <a:rPr lang="en-CA" smtClean="0"/>
+              <a:rPr lang="en-CA" dirty="0"/>
               <a:t>Fourth level</a:t>
             </a:r>
           </a:p>
           <a:p>
             <a:pPr lvl="4"/>
             <a:r>
-              <a:rPr lang="en-CA" smtClean="0"/>
+              <a:rPr lang="en-CA" dirty="0"/>
               <a:t>Fifth level</a:t>
             </a:r>
-            <a:endParaRPr lang="en-US"/>
+            <a:endParaRPr lang="en-US" dirty="0"/>
           </a:p>
         </p:txBody>
       </p:sp>
@@ -3468,7 +3495,9 @@
           <a:lstStyle>
             <a:lvl1pPr marL="0" indent="0">
               <a:buNone/>
-              <a:defRPr sz="1400"/>
+              <a:defRPr sz="1400">
+                <a:latin typeface="+mn-lt"/>
+              </a:defRPr>
             </a:lvl1pPr>
             <a:lvl2pPr marL="457200" indent="0">
               <a:buNone/>
@@ -3506,7 +3535,7 @@
           <a:p>
             <a:pPr lvl="0"/>
             <a:r>
-              <a:rPr lang="en-CA" smtClean="0"/>
+              <a:rPr lang="en-CA" dirty="0"/>
               <a:t>Click to edit Master text styles</a:t>
             </a:r>
           </a:p>
@@ -3514,84 +3543,65 @@
       </p:sp>
       <p:sp>
         <p:nvSpPr>
-          <p:cNvPr id="5" name="Date Placeholder 4"/>
+          <p:cNvPr id="8" name="Footer Placeholder 7">
+            <a:extLst>
+              <a:ext uri="{FF2B5EF4-FFF2-40B4-BE49-F238E27FC236}">
+                <a16:creationId xmlns:a16="http://schemas.microsoft.com/office/drawing/2014/main" id="{1FB8657E-D33B-074B-AE26-E7CBD7232F89}"/>
+              </a:ext>
+            </a:extLst>
+          </p:cNvPr>
           <p:cNvSpPr>
             <a:spLocks noGrp="1"/>
           </p:cNvSpPr>
           <p:nvPr>
-            <p:ph type="dt" sz="half" idx="10"/>
+            <p:ph type="ftr" sz="quarter" idx="10"/>
           </p:nvPr>
         </p:nvSpPr>
         <p:spPr/>
         <p:txBody>
           <a:bodyPr/>
-          <a:lstStyle>
-            <a:lvl1pPr>
-              <a:defRPr smtClean="0"/>
-            </a:lvl1pPr>
-          </a:lstStyle>
-          <a:p>
-            <a:fld id="{8FB6C99C-CAE9-4A46-8B93-5F7F7EFB4D77}" type="datetime1">
-              <a:rPr lang="en-US"/>
-              <a:pPr/>
-              <a:t>16-06-14</a:t>
-            </a:fld>
+          <a:lstStyle/>
+          <a:p>
             <a:endParaRPr lang="en-US"/>
           </a:p>
         </p:txBody>
       </p:sp>
       <p:sp>
         <p:nvSpPr>
-          <p:cNvPr id="6" name="Footer Placeholder 5"/>
+          <p:cNvPr id="9" name="Slide Number Placeholder 8">
+            <a:extLst>
+              <a:ext uri="{FF2B5EF4-FFF2-40B4-BE49-F238E27FC236}">
+                <a16:creationId xmlns:a16="http://schemas.microsoft.com/office/drawing/2014/main" id="{212E3D66-C201-A64A-A27B-A535DB26C750}"/>
+              </a:ext>
+            </a:extLst>
+          </p:cNvPr>
           <p:cNvSpPr>
             <a:spLocks noGrp="1"/>
           </p:cNvSpPr>
           <p:nvPr>
-            <p:ph type="ftr" sz="quarter" idx="11"/>
+            <p:ph type="sldNum" sz="quarter" idx="11"/>
           </p:nvPr>
         </p:nvSpPr>
         <p:spPr/>
         <p:txBody>
           <a:bodyPr/>
-          <a:lstStyle>
-            <a:lvl1pPr>
-              <a:defRPr/>
-            </a:lvl1pPr>
-          </a:lstStyle>
-          <a:p>
-            <a:endParaRPr lang="en-US"/>
-          </a:p>
-        </p:txBody>
-      </p:sp>
-      <p:sp>
-        <p:nvSpPr>
-          <p:cNvPr id="7" name="Slide Number Placeholder 6"/>
-          <p:cNvSpPr>
-            <a:spLocks noGrp="1"/>
-          </p:cNvSpPr>
-          <p:nvPr>
-            <p:ph type="sldNum" sz="quarter" idx="12"/>
-          </p:nvPr>
-        </p:nvSpPr>
-        <p:spPr/>
-        <p:txBody>
-          <a:bodyPr/>
-          <a:lstStyle>
-            <a:lvl1pPr>
-              <a:defRPr smtClean="0"/>
-            </a:lvl1pPr>
-          </a:lstStyle>
-          <a:p>
-            <a:fld id="{380A3164-1B8E-6F4D-B190-04FA596754D0}" type="slidenum">
-              <a:rPr lang="en-US"/>
+          <a:lstStyle/>
+          <a:p>
+            <a:fld id="{95FC67CD-6733-D04F-B9BE-AD105949F24E}" type="slidenum">
+              <a:rPr lang="en-US" smtClean="0"/>
               <a:pPr/>
               <a:t>‹#›</a:t>
             </a:fld>
-            <a:endParaRPr lang="en-US"/>
+            <a:endParaRPr lang="en-US" dirty="0"/>
           </a:p>
         </p:txBody>
       </p:sp>
     </p:spTree>
+    <p:extLst>
+      <p:ext uri="{BB962C8B-B14F-4D97-AF65-F5344CB8AC3E}">
+        <p14:creationId xmlns:p14="http://schemas.microsoft.com/office/powerpoint/2010/main" val="1603863747"/>
+      </p:ext>
+    </p:extLst>
   </p:cSld>
   <p:clrMapOvr>
     <a:masterClrMapping/>
@@ -3636,15 +3646,17 @@
           <a:bodyPr anchor="b"/>
           <a:lstStyle>
             <a:lvl1pPr algn="l">
-              <a:defRPr sz="2000" b="1"/>
+              <a:defRPr sz="2000" b="1">
+                <a:latin typeface="+mj-lt"/>
+              </a:defRPr>
             </a:lvl1pPr>
           </a:lstStyle>
           <a:p>
             <a:r>
-              <a:rPr lang="en-CA" smtClean="0"/>
+              <a:rPr lang="en-CA" dirty="0"/>
               <a:t>Click to edit Master title style</a:t>
             </a:r>
-            <a:endParaRPr lang="en-US"/>
+            <a:endParaRPr lang="en-US" dirty="0"/>
           </a:p>
         </p:txBody>
       </p:sp>
@@ -3705,7 +3717,7 @@
             </a:lvl9pPr>
           </a:lstStyle>
           <a:p>
-            <a:endParaRPr lang="en-US"/>
+            <a:endParaRPr lang="en-US" dirty="0"/>
           </a:p>
         </p:txBody>
       </p:sp>
@@ -3730,7 +3742,9 @@
           <a:lstStyle>
             <a:lvl1pPr marL="0" indent="0">
               <a:buNone/>
-              <a:defRPr sz="1400"/>
+              <a:defRPr sz="1400">
+                <a:latin typeface="+mn-lt"/>
+              </a:defRPr>
             </a:lvl1pPr>
             <a:lvl2pPr marL="457200" indent="0">
               <a:buNone/>
@@ -3768,7 +3782,7 @@
           <a:p>
             <a:pPr lvl="0"/>
             <a:r>
-              <a:rPr lang="en-CA" smtClean="0"/>
+              <a:rPr lang="en-CA" dirty="0"/>
               <a:t>Click to edit Master text styles</a:t>
             </a:r>
           </a:p>
@@ -3776,84 +3790,65 @@
       </p:sp>
       <p:sp>
         <p:nvSpPr>
-          <p:cNvPr id="5" name="Date Placeholder 4"/>
+          <p:cNvPr id="8" name="Footer Placeholder 7">
+            <a:extLst>
+              <a:ext uri="{FF2B5EF4-FFF2-40B4-BE49-F238E27FC236}">
+                <a16:creationId xmlns:a16="http://schemas.microsoft.com/office/drawing/2014/main" id="{B5BB785B-8CD1-0040-A247-EDEF010C15C9}"/>
+              </a:ext>
+            </a:extLst>
+          </p:cNvPr>
           <p:cNvSpPr>
             <a:spLocks noGrp="1"/>
           </p:cNvSpPr>
           <p:nvPr>
-            <p:ph type="dt" sz="half" idx="10"/>
+            <p:ph type="ftr" sz="quarter" idx="10"/>
           </p:nvPr>
         </p:nvSpPr>
         <p:spPr/>
         <p:txBody>
           <a:bodyPr/>
-          <a:lstStyle>
-            <a:lvl1pPr>
-              <a:defRPr smtClean="0"/>
-            </a:lvl1pPr>
-          </a:lstStyle>
-          <a:p>
-            <a:fld id="{E16CD525-494F-8149-9830-A66ADF4FE65A}" type="datetime1">
-              <a:rPr lang="en-US"/>
-              <a:pPr/>
-              <a:t>16-06-14</a:t>
-            </a:fld>
+          <a:lstStyle/>
+          <a:p>
             <a:endParaRPr lang="en-US"/>
           </a:p>
         </p:txBody>
       </p:sp>
       <p:sp>
         <p:nvSpPr>
-          <p:cNvPr id="6" name="Footer Placeholder 5"/>
+          <p:cNvPr id="9" name="Slide Number Placeholder 8">
+            <a:extLst>
+              <a:ext uri="{FF2B5EF4-FFF2-40B4-BE49-F238E27FC236}">
+                <a16:creationId xmlns:a16="http://schemas.microsoft.com/office/drawing/2014/main" id="{A1275E30-5B29-BD43-B756-3D1D1E7E12BD}"/>
+              </a:ext>
+            </a:extLst>
+          </p:cNvPr>
           <p:cNvSpPr>
             <a:spLocks noGrp="1"/>
           </p:cNvSpPr>
           <p:nvPr>
-            <p:ph type="ftr" sz="quarter" idx="11"/>
+            <p:ph type="sldNum" sz="quarter" idx="11"/>
           </p:nvPr>
         </p:nvSpPr>
         <p:spPr/>
         <p:txBody>
           <a:bodyPr/>
-          <a:lstStyle>
-            <a:lvl1pPr>
-              <a:defRPr/>
-            </a:lvl1pPr>
-          </a:lstStyle>
-          <a:p>
-            <a:endParaRPr lang="en-US"/>
-          </a:p>
-        </p:txBody>
-      </p:sp>
-      <p:sp>
-        <p:nvSpPr>
-          <p:cNvPr id="7" name="Slide Number Placeholder 6"/>
-          <p:cNvSpPr>
-            <a:spLocks noGrp="1"/>
-          </p:cNvSpPr>
-          <p:nvPr>
-            <p:ph type="sldNum" sz="quarter" idx="12"/>
-          </p:nvPr>
-        </p:nvSpPr>
-        <p:spPr/>
-        <p:txBody>
-          <a:bodyPr/>
-          <a:lstStyle>
-            <a:lvl1pPr>
-              <a:defRPr smtClean="0"/>
-            </a:lvl1pPr>
-          </a:lstStyle>
-          <a:p>
-            <a:fld id="{4C6BC3C8-C01D-8942-A408-A7FA9DA2012F}" type="slidenum">
-              <a:rPr lang="en-US"/>
+          <a:lstStyle/>
+          <a:p>
+            <a:fld id="{95FC67CD-6733-D04F-B9BE-AD105949F24E}" type="slidenum">
+              <a:rPr lang="en-US" smtClean="0"/>
               <a:pPr/>
               <a:t>‹#›</a:t>
             </a:fld>
-            <a:endParaRPr lang="en-US"/>
+            <a:endParaRPr lang="en-US" dirty="0"/>
           </a:p>
         </p:txBody>
       </p:sp>
     </p:spTree>
+    <p:extLst>
+      <p:ext uri="{BB962C8B-B14F-4D97-AF65-F5344CB8AC3E}">
+        <p14:creationId xmlns:p14="http://schemas.microsoft.com/office/powerpoint/2010/main" val="2086922824"/>
+      </p:ext>
+    </p:extLst>
   </p:cSld>
   <p:clrMapOvr>
     <a:masterClrMapping/>
@@ -3862,7 +3857,7 @@
 </file>
 
 <file path=ppt/slideMasters/slideMaster1.xml><?xml version="1.0" encoding="utf-8"?>
-<p:sldMaster xmlns:a="http://schemas.openxmlformats.org/drawingml/2006/main" xmlns:r="http://schemas.openxmlformats.org/officeDocument/2006/relationships" xmlns:p="http://schemas.openxmlformats.org/presentationml/2006/main">
+<p:sldMaster xmlns:a="http://schemas.openxmlformats.org/drawingml/2006/main" xmlns:r="http://schemas.openxmlformats.org/officeDocument/2006/relationships" xmlns:p="http://schemas.openxmlformats.org/presentationml/2006/main" preserve="1">
   <p:cSld>
     <p:bg>
       <p:bgPr>
@@ -3997,100 +3992,6 @@
               <a:rPr lang="en-US" dirty="0"/>
               <a:t>Fifth level</a:t>
             </a:r>
-          </a:p>
-        </p:txBody>
-      </p:sp>
-      <p:sp>
-        <p:nvSpPr>
-          <p:cNvPr id="1028" name="Rectangle 4"/>
-          <p:cNvSpPr>
-            <a:spLocks noGrp="1" noChangeArrowheads="1"/>
-          </p:cNvSpPr>
-          <p:nvPr>
-            <p:ph type="dt" sz="half" idx="2"/>
-          </p:nvPr>
-        </p:nvSpPr>
-        <p:spPr bwMode="auto">
-          <a:xfrm>
-            <a:off x="685800" y="6248400"/>
-            <a:ext cx="1905000" cy="457200"/>
-          </a:xfrm>
-          <a:prstGeom prst="rect">
-            <a:avLst/>
-          </a:prstGeom>
-          <a:noFill/>
-          <a:ln w="9525">
-            <a:noFill/>
-            <a:miter lim="800000"/>
-            <a:headEnd/>
-            <a:tailEnd/>
-          </a:ln>
-          <a:effectLst/>
-        </p:spPr>
-        <p:txBody>
-          <a:bodyPr vert="horz" wrap="square" lIns="91440" tIns="45720" rIns="91440" bIns="45720" numCol="1" anchor="t" anchorCtr="0" compatLnSpc="1">
-            <a:prstTxWarp prst="textNoShape">
-              <a:avLst/>
-            </a:prstTxWarp>
-          </a:bodyPr>
-          <a:lstStyle>
-            <a:lvl1pPr>
-              <a:defRPr sz="1400">
-                <a:latin typeface="Candara"/>
-                <a:cs typeface="Candara"/>
-              </a:defRPr>
-            </a:lvl1pPr>
-          </a:lstStyle>
-          <a:p>
-            <a:fld id="{6780C54A-2D28-A949-AD94-8E7C2BB17BBF}" type="datetime1">
-              <a:rPr lang="en-US" smtClean="0"/>
-              <a:pPr/>
-              <a:t>16-06-14</a:t>
-            </a:fld>
-            <a:endParaRPr lang="en-US" dirty="0"/>
-          </a:p>
-        </p:txBody>
-      </p:sp>
-      <p:sp>
-        <p:nvSpPr>
-          <p:cNvPr id="1029" name="Rectangle 5"/>
-          <p:cNvSpPr>
-            <a:spLocks noGrp="1" noChangeArrowheads="1"/>
-          </p:cNvSpPr>
-          <p:nvPr>
-            <p:ph type="ftr" sz="quarter" idx="3"/>
-          </p:nvPr>
-        </p:nvSpPr>
-        <p:spPr bwMode="auto">
-          <a:xfrm>
-            <a:off x="3124200" y="6248400"/>
-            <a:ext cx="2895600" cy="457200"/>
-          </a:xfrm>
-          <a:prstGeom prst="rect">
-            <a:avLst/>
-          </a:prstGeom>
-          <a:noFill/>
-          <a:ln w="9525">
-            <a:noFill/>
-            <a:miter lim="800000"/>
-            <a:headEnd/>
-            <a:tailEnd/>
-          </a:ln>
-          <a:effectLst/>
-        </p:spPr>
-        <p:txBody>
-          <a:bodyPr vert="horz" wrap="square" lIns="91440" tIns="45720" rIns="91440" bIns="45720" numCol="1" anchor="t" anchorCtr="0" compatLnSpc="1">
-            <a:prstTxWarp prst="textNoShape">
-              <a:avLst/>
-            </a:prstTxWarp>
-          </a:bodyPr>
-          <a:lstStyle>
-            <a:lvl1pPr algn="ctr">
-              <a:defRPr sz="1400"/>
-            </a:lvl1pPr>
-          </a:lstStyle>
-          <a:p>
-            <a:endParaRPr lang="en-US" dirty="0"/>
           </a:p>
         </p:txBody>
       </p:sp>
@@ -4130,7 +4031,7 @@
           <a:lstStyle>
             <a:lvl1pPr algn="r">
               <a:defRPr sz="1400">
-                <a:latin typeface="Candara"/>
+                <a:latin typeface="+mn-lt"/>
                 <a:cs typeface="Candara"/>
               </a:defRPr>
             </a:lvl1pPr>
@@ -4145,21 +4046,69 @@
           </a:p>
         </p:txBody>
       </p:sp>
+      <p:sp>
+        <p:nvSpPr>
+          <p:cNvPr id="2" name="Footer Placeholder 1">
+            <a:extLst>
+              <a:ext uri="{FF2B5EF4-FFF2-40B4-BE49-F238E27FC236}">
+                <a16:creationId xmlns:a16="http://schemas.microsoft.com/office/drawing/2014/main" id="{20CEA516-DB0A-A54B-8590-B485BCFD422E}"/>
+              </a:ext>
+            </a:extLst>
+          </p:cNvPr>
+          <p:cNvSpPr>
+            <a:spLocks noGrp="1"/>
+          </p:cNvSpPr>
+          <p:nvPr>
+            <p:ph type="ftr" sz="quarter" idx="3"/>
+          </p:nvPr>
+        </p:nvSpPr>
+        <p:spPr>
+          <a:xfrm>
+            <a:off x="3028950" y="6356350"/>
+            <a:ext cx="3086100" cy="365125"/>
+          </a:xfrm>
+          <a:prstGeom prst="rect">
+            <a:avLst/>
+          </a:prstGeom>
+        </p:spPr>
+        <p:txBody>
+          <a:bodyPr vert="horz" lIns="91440" tIns="45720" rIns="91440" bIns="45720" rtlCol="0" anchor="ctr"/>
+          <a:lstStyle>
+            <a:lvl1pPr algn="ctr">
+              <a:defRPr sz="1200">
+                <a:solidFill>
+                  <a:schemeClr val="tx1">
+                    <a:tint val="75000"/>
+                  </a:schemeClr>
+                </a:solidFill>
+              </a:defRPr>
+            </a:lvl1pPr>
+          </a:lstStyle>
+          <a:p>
+            <a:endParaRPr lang="en-US"/>
+          </a:p>
+        </p:txBody>
+      </p:sp>
     </p:spTree>
+    <p:extLst>
+      <p:ext uri="{BB962C8B-B14F-4D97-AF65-F5344CB8AC3E}">
+        <p14:creationId xmlns:p14="http://schemas.microsoft.com/office/powerpoint/2010/main" val="737922097"/>
+      </p:ext>
+    </p:extLst>
   </p:cSld>
   <p:clrMap bg1="lt1" tx1="dk1" bg2="lt2" tx2="dk2" accent1="accent1" accent2="accent2" accent3="accent3" accent4="accent4" accent5="accent5" accent6="accent6" hlink="hlink" folHlink="folHlink"/>
   <p:sldLayoutIdLst>
-    <p:sldLayoutId id="2147483649" r:id="rId1"/>
-    <p:sldLayoutId id="2147483650" r:id="rId2"/>
-    <p:sldLayoutId id="2147483651" r:id="rId3"/>
-    <p:sldLayoutId id="2147483652" r:id="rId4"/>
-    <p:sldLayoutId id="2147483653" r:id="rId5"/>
-    <p:sldLayoutId id="2147483654" r:id="rId6"/>
-    <p:sldLayoutId id="2147483655" r:id="rId7"/>
-    <p:sldLayoutId id="2147483656" r:id="rId8"/>
-    <p:sldLayoutId id="2147483657" r:id="rId9"/>
-    <p:sldLayoutId id="2147483658" r:id="rId10"/>
-    <p:sldLayoutId id="2147483659" r:id="rId11"/>
+    <p:sldLayoutId id="2147483661" r:id="rId1"/>
+    <p:sldLayoutId id="2147483662" r:id="rId2"/>
+    <p:sldLayoutId id="2147483663" r:id="rId3"/>
+    <p:sldLayoutId id="2147483664" r:id="rId4"/>
+    <p:sldLayoutId id="2147483665" r:id="rId5"/>
+    <p:sldLayoutId id="2147483666" r:id="rId6"/>
+    <p:sldLayoutId id="2147483667" r:id="rId7"/>
+    <p:sldLayoutId id="2147483668" r:id="rId8"/>
+    <p:sldLayoutId id="2147483669" r:id="rId9"/>
+    <p:sldLayoutId id="2147483670" r:id="rId10"/>
+    <p:sldLayoutId id="2147483671" r:id="rId11"/>
   </p:sldLayoutIdLst>
   <p:hf hdr="0" ftr="0"/>
   <p:txStyles>
@@ -4175,7 +4124,7 @@
           <a:solidFill>
             <a:schemeClr val="tx2"/>
           </a:solidFill>
-          <a:latin typeface="Candara"/>
+          <a:latin typeface="+mj-lt"/>
           <a:ea typeface="+mj-ea"/>
           <a:cs typeface="Candara"/>
         </a:defRPr>
@@ -4306,7 +4255,7 @@
           <a:solidFill>
             <a:schemeClr val="tx1"/>
           </a:solidFill>
-          <a:latin typeface="Candara"/>
+          <a:latin typeface="+mn-lt"/>
           <a:ea typeface="+mn-ea"/>
           <a:cs typeface="Candara"/>
         </a:defRPr>
@@ -4323,7 +4272,7 @@
           <a:solidFill>
             <a:schemeClr val="tx1"/>
           </a:solidFill>
-          <a:latin typeface="Candara"/>
+          <a:latin typeface="+mn-lt"/>
           <a:ea typeface="ＭＳ Ｐゴシック" charset="-128"/>
           <a:cs typeface="Candara"/>
         </a:defRPr>
@@ -4340,7 +4289,7 @@
           <a:solidFill>
             <a:schemeClr val="tx1"/>
           </a:solidFill>
-          <a:latin typeface="Candara"/>
+          <a:latin typeface="+mn-lt"/>
           <a:ea typeface="ＭＳ Ｐゴシック" charset="-128"/>
           <a:cs typeface="Candara"/>
         </a:defRPr>
@@ -4357,7 +4306,7 @@
           <a:solidFill>
             <a:schemeClr val="tx1"/>
           </a:solidFill>
-          <a:latin typeface="Candara"/>
+          <a:latin typeface="+mn-lt"/>
           <a:ea typeface="ＭＳ Ｐゴシック" charset="-128"/>
           <a:cs typeface="Candara"/>
         </a:defRPr>
@@ -4374,7 +4323,7 @@
           <a:solidFill>
             <a:schemeClr val="tx1"/>
           </a:solidFill>
-          <a:latin typeface="Candara"/>
+          <a:latin typeface="+mn-lt"/>
           <a:ea typeface="ＭＳ Ｐゴシック" charset="-128"/>
           <a:cs typeface="Candara"/>
         </a:defRPr>
@@ -4722,6 +4671,36 @@
       </p:sp>
       <p:sp>
         <p:nvSpPr>
+          <p:cNvPr id="2" name="Slide Number Placeholder 1">
+            <a:extLst>
+              <a:ext uri="{FF2B5EF4-FFF2-40B4-BE49-F238E27FC236}">
+                <a16:creationId xmlns:a16="http://schemas.microsoft.com/office/drawing/2014/main" id="{9355B6E1-CF70-6C4C-9275-243CE0E384E6}"/>
+              </a:ext>
+            </a:extLst>
+          </p:cNvPr>
+          <p:cNvSpPr>
+            <a:spLocks noGrp="1"/>
+          </p:cNvSpPr>
+          <p:nvPr>
+            <p:ph type="sldNum" sz="quarter" idx="11"/>
+          </p:nvPr>
+        </p:nvSpPr>
+        <p:spPr/>
+        <p:txBody>
+          <a:bodyPr/>
+          <a:lstStyle/>
+          <a:p>
+            <a:fld id="{6EE4AD0E-E41E-A948-ABBD-15AD007DE1F0}" type="slidenum">
+              <a:rPr lang="en-US" smtClean="0"/>
+              <a:pPr/>
+              <a:t>1</a:t>
+            </a:fld>
+            <a:endParaRPr lang="en-US"/>
+          </a:p>
+        </p:txBody>
+      </p:sp>
+      <p:sp>
+        <p:nvSpPr>
           <p:cNvPr id="205" name="Shape 205"/>
           <p:cNvSpPr/>
           <p:nvPr/>
@@ -4791,13 +4770,6 @@
   <p:clrMapOvr>
     <a:masterClrMapping/>
   </p:clrMapOvr>
-  <p:timing>
-    <p:tnLst>
-      <p:par>
-        <p:cTn xmlns:p14="http://schemas.microsoft.com/office/powerpoint/2010/main" id="1" dur="indefinite" restart="never" nodeType="tmRoot"/>
-      </p:par>
-    </p:tnLst>
-  </p:timing>
 </p:sld>
 </file>
 
@@ -4820,12 +4792,12 @@
       </p:grpSpPr>
       <p:sp>
         <p:nvSpPr>
-          <p:cNvPr id="4" name="Date Placeholder 3"/>
+          <p:cNvPr id="79874" name="Rectangle 2"/>
           <p:cNvSpPr>
-            <a:spLocks noGrp="1"/>
+            <a:spLocks noGrp="1" noChangeArrowheads="1"/>
           </p:cNvSpPr>
           <p:nvPr>
-            <p:ph type="dt" sz="half" idx="10"/>
+            <p:ph type="title"/>
           </p:nvPr>
         </p:nvSpPr>
         <p:spPr/>
@@ -4833,12 +4805,48 @@
           <a:bodyPr/>
           <a:lstStyle/>
           <a:p>
-            <a:fld id="{17243645-5532-B54D-9214-6DB6110F9A7C}" type="datetime1">
+            <a:r>
               <a:rPr lang="en-US"/>
-              <a:pPr/>
-              <a:t>16-06-14</a:t>
-            </a:fld>
-            <a:endParaRPr lang="en-US"/>
+              <a:t>Context-free languages and Pushdown Automata</a:t>
+            </a:r>
+          </a:p>
+        </p:txBody>
+      </p:sp>
+      <p:sp>
+        <p:nvSpPr>
+          <p:cNvPr id="79875" name="Rectangle 3"/>
+          <p:cNvSpPr>
+            <a:spLocks noGrp="1" noChangeArrowheads="1"/>
+          </p:cNvSpPr>
+          <p:nvPr>
+            <p:ph idx="1"/>
+          </p:nvPr>
+        </p:nvSpPr>
+        <p:spPr/>
+        <p:txBody>
+          <a:bodyPr/>
+          <a:lstStyle/>
+          <a:p>
+            <a:r>
+              <a:rPr lang="en-US"/>
+              <a:t>Recall that for each regular language there was an equivalent finite-state automaton</a:t>
+            </a:r>
+          </a:p>
+          <a:p>
+            <a:r>
+              <a:rPr lang="en-US"/>
+              <a:t>The FSA was used as a recognizer of the regular language</a:t>
+            </a:r>
+          </a:p>
+          <a:p>
+            <a:r>
+              <a:rPr lang="en-US"/>
+              <a:t>For each context-free language there is also an automaton that recognizes it: called a </a:t>
+            </a:r>
+            <a:r>
+              <a:rPr lang="en-US" b="1"/>
+              <a:t>pushdown automaton (pda)</a:t>
+            </a:r>
           </a:p>
         </p:txBody>
       </p:sp>
@@ -4863,66 +4871,6 @@
               <a:t>2</a:t>
             </a:fld>
             <a:endParaRPr lang="en-US"/>
-          </a:p>
-        </p:txBody>
-      </p:sp>
-      <p:sp>
-        <p:nvSpPr>
-          <p:cNvPr id="79874" name="Rectangle 2"/>
-          <p:cNvSpPr>
-            <a:spLocks noGrp="1" noChangeArrowheads="1"/>
-          </p:cNvSpPr>
-          <p:nvPr>
-            <p:ph type="title"/>
-          </p:nvPr>
-        </p:nvSpPr>
-        <p:spPr/>
-        <p:txBody>
-          <a:bodyPr/>
-          <a:lstStyle/>
-          <a:p>
-            <a:r>
-              <a:rPr lang="en-US"/>
-              <a:t>Context-free languages and Pushdown Automata</a:t>
-            </a:r>
-          </a:p>
-        </p:txBody>
-      </p:sp>
-      <p:sp>
-        <p:nvSpPr>
-          <p:cNvPr id="79875" name="Rectangle 3"/>
-          <p:cNvSpPr>
-            <a:spLocks noGrp="1" noChangeArrowheads="1"/>
-          </p:cNvSpPr>
-          <p:nvPr>
-            <p:ph type="body" idx="1"/>
-          </p:nvPr>
-        </p:nvSpPr>
-        <p:spPr/>
-        <p:txBody>
-          <a:bodyPr/>
-          <a:lstStyle/>
-          <a:p>
-            <a:r>
-              <a:rPr lang="en-US"/>
-              <a:t>Recall that for each regular language there was an equivalent finite-state automaton</a:t>
-            </a:r>
-          </a:p>
-          <a:p>
-            <a:r>
-              <a:rPr lang="en-US"/>
-              <a:t>The FSA was used as a recognizer of the regular language</a:t>
-            </a:r>
-          </a:p>
-          <a:p>
-            <a:r>
-              <a:rPr lang="en-US"/>
-              <a:t>For each context-free language there is also an automaton that recognizes it: called a </a:t>
-            </a:r>
-            <a:r>
-              <a:rPr lang="en-US" b="1"/>
-              <a:t>pushdown automaton (pda)</a:t>
-            </a:r>
           </a:p>
         </p:txBody>
       </p:sp>
@@ -4934,7 +4882,7 @@
   <p:timing>
     <p:tnLst>
       <p:par>
-        <p:cTn xmlns:p14="http://schemas.microsoft.com/office/powerpoint/2010/main" id="1" dur="indefinite" restart="never" nodeType="tmRoot">
+        <p:cTn id="1" dur="indefinite" restart="never" nodeType="tmRoot">
           <p:childTnLst>
             <p:seq concurrent="1" nextAc="seek">
               <p:cTn id="2" dur="indefinite" nodeType="mainSeq">
@@ -5176,13 +5124,55 @@
                 <a:tableStyleId>{5C22544A-7EE6-4342-B048-85BDC9FD1C3A}</a:tableStyleId>
               </a:tblPr>
               <a:tblGrid>
-                <a:gridCol w="442016"/>
-                <a:gridCol w="442016"/>
-                <a:gridCol w="442016"/>
-                <a:gridCol w="442016"/>
-                <a:gridCol w="442016"/>
-                <a:gridCol w="442016"/>
-                <a:gridCol w="442016"/>
+                <a:gridCol w="442016">
+                  <a:extLst>
+                    <a:ext uri="{9D8B030D-6E8A-4147-A177-3AD203B41FA5}">
+                      <a16:colId xmlns:a16="http://schemas.microsoft.com/office/drawing/2014/main" val="20000"/>
+                    </a:ext>
+                  </a:extLst>
+                </a:gridCol>
+                <a:gridCol w="442016">
+                  <a:extLst>
+                    <a:ext uri="{9D8B030D-6E8A-4147-A177-3AD203B41FA5}">
+                      <a16:colId xmlns:a16="http://schemas.microsoft.com/office/drawing/2014/main" val="20001"/>
+                    </a:ext>
+                  </a:extLst>
+                </a:gridCol>
+                <a:gridCol w="442016">
+                  <a:extLst>
+                    <a:ext uri="{9D8B030D-6E8A-4147-A177-3AD203B41FA5}">
+                      <a16:colId xmlns:a16="http://schemas.microsoft.com/office/drawing/2014/main" val="20002"/>
+                    </a:ext>
+                  </a:extLst>
+                </a:gridCol>
+                <a:gridCol w="442016">
+                  <a:extLst>
+                    <a:ext uri="{9D8B030D-6E8A-4147-A177-3AD203B41FA5}">
+                      <a16:colId xmlns:a16="http://schemas.microsoft.com/office/drawing/2014/main" val="20003"/>
+                    </a:ext>
+                  </a:extLst>
+                </a:gridCol>
+                <a:gridCol w="442016">
+                  <a:extLst>
+                    <a:ext uri="{9D8B030D-6E8A-4147-A177-3AD203B41FA5}">
+                      <a16:colId xmlns:a16="http://schemas.microsoft.com/office/drawing/2014/main" val="20004"/>
+                    </a:ext>
+                  </a:extLst>
+                </a:gridCol>
+                <a:gridCol w="442016">
+                  <a:extLst>
+                    <a:ext uri="{9D8B030D-6E8A-4147-A177-3AD203B41FA5}">
+                      <a16:colId xmlns:a16="http://schemas.microsoft.com/office/drawing/2014/main" val="20005"/>
+                    </a:ext>
+                  </a:extLst>
+                </a:gridCol>
+                <a:gridCol w="442016">
+                  <a:extLst>
+                    <a:ext uri="{9D8B030D-6E8A-4147-A177-3AD203B41FA5}">
+                      <a16:colId xmlns:a16="http://schemas.microsoft.com/office/drawing/2014/main" val="20006"/>
+                    </a:ext>
+                  </a:extLst>
+                </a:gridCol>
               </a:tblGrid>
               <a:tr h="370840">
                 <a:tc>
@@ -5521,35 +5511,16 @@
                     <a:noFill/>
                   </a:tcPr>
                 </a:tc>
+                <a:extLst>
+                  <a:ext uri="{0D108BD9-81ED-4DB2-BD59-A6C34878D82A}">
+                    <a16:rowId xmlns:a16="http://schemas.microsoft.com/office/drawing/2014/main" val="10000"/>
+                  </a:ext>
+                </a:extLst>
               </a:tr>
             </a:tbl>
           </a:graphicData>
         </a:graphic>
       </p:graphicFrame>
-      <p:sp>
-        <p:nvSpPr>
-          <p:cNvPr id="4" name="Date Placeholder 3"/>
-          <p:cNvSpPr>
-            <a:spLocks noGrp="1"/>
-          </p:cNvSpPr>
-          <p:nvPr>
-            <p:ph type="dt" sz="half" idx="10"/>
-          </p:nvPr>
-        </p:nvSpPr>
-        <p:spPr/>
-        <p:txBody>
-          <a:bodyPr/>
-          <a:lstStyle/>
-          <a:p>
-            <a:fld id="{F668E4B5-49D5-B048-B5A5-3831D6A375F6}" type="datetime1">
-              <a:rPr lang="en-US" smtClean="0"/>
-              <a:pPr/>
-              <a:t>16-06-14</a:t>
-            </a:fld>
-            <a:endParaRPr lang="en-US"/>
-          </a:p>
-        </p:txBody>
-      </p:sp>
       <p:sp>
         <p:nvSpPr>
           <p:cNvPr id="5" name="Slide Number Placeholder 4"/>
@@ -5625,7 +5596,7 @@
               <a:tabLst/>
             </a:pPr>
             <a:r>
-              <a:rPr kumimoji="0" lang="en-CA" sz="2400" b="0" i="0" u="none" strike="noStrike" cap="none" normalizeH="0" baseline="0" dirty="0" smtClean="0">
+              <a:rPr kumimoji="0" lang="en-CA" sz="2400" b="0" i="0" u="none" strike="noStrike" cap="none" normalizeH="0" baseline="0" dirty="0">
                 <a:ln>
                   <a:noFill/>
                 </a:ln>
@@ -5637,16 +5608,6 @@
               </a:rPr>
               <a:t>Finite State Automaton</a:t>
             </a:r>
-            <a:endParaRPr kumimoji="0" lang="en-CA" sz="2400" b="0" i="0" u="none" strike="noStrike" cap="none" normalizeH="0" baseline="0" dirty="0">
-              <a:ln>
-                <a:noFill/>
-              </a:ln>
-              <a:solidFill>
-                <a:schemeClr val="tx1"/>
-              </a:solidFill>
-              <a:effectLst/>
-              <a:latin typeface="Times" charset="0"/>
-            </a:endParaRPr>
           </a:p>
         </p:txBody>
       </p:sp>
@@ -5762,10 +5723,9 @@
           <a:lstStyle/>
           <a:p>
             <a:r>
-              <a:rPr lang="en-CA" dirty="0" smtClean="0"/>
+              <a:rPr lang="en-CA" dirty="0"/>
               <a:t>input</a:t>
             </a:r>
-            <a:endParaRPr lang="en-CA" dirty="0"/>
           </a:p>
         </p:txBody>
       </p:sp>
@@ -5981,17 +5941,16 @@
             <a:p>
               <a:pPr algn="ctr"/>
               <a:r>
-                <a:rPr lang="en-CA" dirty="0" smtClean="0"/>
+                <a:rPr lang="en-CA" dirty="0"/>
                 <a:t>Stack</a:t>
               </a:r>
             </a:p>
             <a:p>
               <a:pPr algn="ctr"/>
               <a:r>
-                <a:rPr lang="en-CA" dirty="0" smtClean="0"/>
+                <a:rPr lang="en-CA" dirty="0"/>
                 <a:t>(last in, first out)</a:t>
               </a:r>
-              <a:endParaRPr lang="en-CA" dirty="0"/>
             </a:p>
           </p:txBody>
         </p:sp>
@@ -6009,7 +5968,7 @@
   <p:timing>
     <p:tnLst>
       <p:par>
-        <p:cTn xmlns:p14="http://schemas.microsoft.com/office/powerpoint/2010/main" id="1" dur="indefinite" restart="never" nodeType="tmRoot">
+        <p:cTn id="1" dur="indefinite" restart="never" nodeType="tmRoot">
           <p:childTnLst>
             <p:seq concurrent="1" nextAc="seek">
               <p:cTn id="2" dur="indefinite" nodeType="mainSeq">
@@ -6130,12 +6089,12 @@
       </p:grpSpPr>
       <p:sp>
         <p:nvSpPr>
-          <p:cNvPr id="4" name="Date Placeholder 3"/>
+          <p:cNvPr id="138242" name="Rectangle 2"/>
           <p:cNvSpPr>
-            <a:spLocks noGrp="1"/>
+            <a:spLocks noGrp="1" noChangeArrowheads="1"/>
           </p:cNvSpPr>
           <p:nvPr>
-            <p:ph type="dt" sz="half" idx="10"/>
+            <p:ph type="title"/>
           </p:nvPr>
         </p:nvSpPr>
         <p:spPr/>
@@ -6143,12 +6102,93 @@
           <a:bodyPr/>
           <a:lstStyle/>
           <a:p>
-            <a:fld id="{D2ED6336-1D54-8748-BAE3-42CB54D9CC21}" type="datetime1">
+            <a:r>
               <a:rPr lang="en-US"/>
-              <a:pPr/>
-              <a:t>16-06-14</a:t>
-            </a:fld>
-            <a:endParaRPr lang="en-US"/>
+              <a:t>Context-free languages and Pushdown Automata</a:t>
+            </a:r>
+          </a:p>
+        </p:txBody>
+      </p:sp>
+      <p:sp>
+        <p:nvSpPr>
+          <p:cNvPr id="138243" name="Rectangle 3"/>
+          <p:cNvSpPr>
+            <a:spLocks noGrp="1" noChangeArrowheads="1"/>
+          </p:cNvSpPr>
+          <p:nvPr>
+            <p:ph idx="1"/>
+          </p:nvPr>
+        </p:nvSpPr>
+        <p:spPr/>
+        <p:txBody>
+          <a:bodyPr/>
+          <a:lstStyle/>
+          <a:p>
+            <a:pPr>
+              <a:lnSpc>
+                <a:spcPct val="90000"/>
+              </a:lnSpc>
+            </a:pPr>
+            <a:r>
+              <a:rPr lang="en-US" sz="2400"/>
+              <a:t>Similar to FSAs there are non-deterministic pda and deterministic pda</a:t>
+            </a:r>
+          </a:p>
+          <a:p>
+            <a:pPr>
+              <a:lnSpc>
+                <a:spcPct val="90000"/>
+              </a:lnSpc>
+            </a:pPr>
+            <a:r>
+              <a:rPr lang="en-US" sz="2400"/>
+              <a:t>Unlike in the case of FSAs we cannot always convert a npda to a dpda</a:t>
+            </a:r>
+          </a:p>
+          <a:p>
+            <a:pPr>
+              <a:lnSpc>
+                <a:spcPct val="90000"/>
+              </a:lnSpc>
+            </a:pPr>
+            <a:r>
+              <a:rPr lang="en-US" sz="2400"/>
+              <a:t>Our goal in compiler design will be to choose grammars carefully so that we can always provide a dpda for it</a:t>
+            </a:r>
+          </a:p>
+          <a:p>
+            <a:pPr>
+              <a:lnSpc>
+                <a:spcPct val="90000"/>
+              </a:lnSpc>
+            </a:pPr>
+            <a:r>
+              <a:rPr lang="en-US" sz="2400"/>
+              <a:t>Similar to the FSA case, a DFA construction provides us with the algorithm for lexical analysis, </a:t>
+            </a:r>
+          </a:p>
+          <a:p>
+            <a:pPr>
+              <a:lnSpc>
+                <a:spcPct val="90000"/>
+              </a:lnSpc>
+            </a:pPr>
+            <a:r>
+              <a:rPr lang="en-US" sz="2400"/>
+              <a:t>In this case the construction of a dpda will provide us with the algorithm for parsing (take in strings and provide the parse tree)</a:t>
+            </a:r>
+          </a:p>
+          <a:p>
+            <a:pPr>
+              <a:lnSpc>
+                <a:spcPct val="90000"/>
+              </a:lnSpc>
+            </a:pPr>
+            <a:r>
+              <a:rPr lang="en-US" sz="2400"/>
+              <a:t>We will study later how to convert a given CFG into a parser by first converting into a PDA</a:t>
+            </a:r>
+            <a:endParaRPr lang="en-US" sz="2400" b="1"/>
           </a:p>
         </p:txBody>
       </p:sp>
@@ -6173,111 +6213,6 @@
               <a:t>4</a:t>
             </a:fld>
             <a:endParaRPr lang="en-US"/>
-          </a:p>
-        </p:txBody>
-      </p:sp>
-      <p:sp>
-        <p:nvSpPr>
-          <p:cNvPr id="138242" name="Rectangle 2"/>
-          <p:cNvSpPr>
-            <a:spLocks noGrp="1" noChangeArrowheads="1"/>
-          </p:cNvSpPr>
-          <p:nvPr>
-            <p:ph type="title"/>
-          </p:nvPr>
-        </p:nvSpPr>
-        <p:spPr/>
-        <p:txBody>
-          <a:bodyPr/>
-          <a:lstStyle/>
-          <a:p>
-            <a:r>
-              <a:rPr lang="en-US"/>
-              <a:t>Context-free languages and Pushdown Automata</a:t>
-            </a:r>
-          </a:p>
-        </p:txBody>
-      </p:sp>
-      <p:sp>
-        <p:nvSpPr>
-          <p:cNvPr id="138243" name="Rectangle 3"/>
-          <p:cNvSpPr>
-            <a:spLocks noGrp="1" noChangeArrowheads="1"/>
-          </p:cNvSpPr>
-          <p:nvPr>
-            <p:ph type="body" idx="1"/>
-          </p:nvPr>
-        </p:nvSpPr>
-        <p:spPr/>
-        <p:txBody>
-          <a:bodyPr/>
-          <a:lstStyle/>
-          <a:p>
-            <a:pPr>
-              <a:lnSpc>
-                <a:spcPct val="90000"/>
-              </a:lnSpc>
-            </a:pPr>
-            <a:r>
-              <a:rPr lang="en-US" sz="2400"/>
-              <a:t>Similar to FSAs there are non-deterministic pda and deterministic pda</a:t>
-            </a:r>
-          </a:p>
-          <a:p>
-            <a:pPr>
-              <a:lnSpc>
-                <a:spcPct val="90000"/>
-              </a:lnSpc>
-            </a:pPr>
-            <a:r>
-              <a:rPr lang="en-US" sz="2400"/>
-              <a:t>Unlike in the case of FSAs we cannot always convert a npda to a dpda</a:t>
-            </a:r>
-          </a:p>
-          <a:p>
-            <a:pPr>
-              <a:lnSpc>
-                <a:spcPct val="90000"/>
-              </a:lnSpc>
-            </a:pPr>
-            <a:r>
-              <a:rPr lang="en-US" sz="2400"/>
-              <a:t>Our goal in compiler design will be to choose grammars carefully so that we can always provide a dpda for it</a:t>
-            </a:r>
-          </a:p>
-          <a:p>
-            <a:pPr>
-              <a:lnSpc>
-                <a:spcPct val="90000"/>
-              </a:lnSpc>
-            </a:pPr>
-            <a:r>
-              <a:rPr lang="en-US" sz="2400"/>
-              <a:t>Similar to the FSA case, a DFA construction provides us with the algorithm for lexical analysis, </a:t>
-            </a:r>
-          </a:p>
-          <a:p>
-            <a:pPr>
-              <a:lnSpc>
-                <a:spcPct val="90000"/>
-              </a:lnSpc>
-            </a:pPr>
-            <a:r>
-              <a:rPr lang="en-US" sz="2400"/>
-              <a:t>In this case the construction of a dpda will provide us with the algorithm for parsing (take in strings and provide the parse tree)</a:t>
-            </a:r>
-          </a:p>
-          <a:p>
-            <a:pPr>
-              <a:lnSpc>
-                <a:spcPct val="90000"/>
-              </a:lnSpc>
-            </a:pPr>
-            <a:r>
-              <a:rPr lang="en-US" sz="2400"/>
-              <a:t>We will study later how to convert a given CFG into a parser by first converting into a PDA</a:t>
-            </a:r>
-            <a:endParaRPr lang="en-US" sz="2400" b="1"/>
           </a:p>
         </p:txBody>
       </p:sp>
@@ -6289,7 +6224,7 @@
   <p:timing>
     <p:tnLst>
       <p:par>
-        <p:cTn xmlns:p14="http://schemas.microsoft.com/office/powerpoint/2010/main" id="1" dur="indefinite" restart="never" nodeType="tmRoot">
+        <p:cTn id="1" dur="indefinite" restart="never" nodeType="tmRoot">
           <p:childTnLst>
             <p:seq concurrent="1" nextAc="seek">
               <p:cTn id="2" dur="indefinite" nodeType="mainSeq">
@@ -6635,54 +6570,6 @@
       </p:grpSpPr>
       <p:sp>
         <p:nvSpPr>
-          <p:cNvPr id="29" name="Date Placeholder 2"/>
-          <p:cNvSpPr>
-            <a:spLocks noGrp="1"/>
-          </p:cNvSpPr>
-          <p:nvPr>
-            <p:ph type="dt" sz="half" idx="10"/>
-          </p:nvPr>
-        </p:nvSpPr>
-        <p:spPr/>
-        <p:txBody>
-          <a:bodyPr/>
-          <a:lstStyle/>
-          <a:p>
-            <a:fld id="{1A676205-8F34-2A43-8675-242774F45B9D}" type="datetime1">
-              <a:rPr lang="en-US"/>
-              <a:pPr/>
-              <a:t>16-06-14</a:t>
-            </a:fld>
-            <a:endParaRPr lang="en-US" dirty="0"/>
-          </a:p>
-        </p:txBody>
-      </p:sp>
-      <p:sp>
-        <p:nvSpPr>
-          <p:cNvPr id="30" name="Slide Number Placeholder 4"/>
-          <p:cNvSpPr>
-            <a:spLocks noGrp="1"/>
-          </p:cNvSpPr>
-          <p:nvPr>
-            <p:ph type="sldNum" sz="quarter" idx="12"/>
-          </p:nvPr>
-        </p:nvSpPr>
-        <p:spPr/>
-        <p:txBody>
-          <a:bodyPr/>
-          <a:lstStyle/>
-          <a:p>
-            <a:fld id="{F950F278-9B0C-A44F-BDA0-E8F997FA71A7}" type="slidenum">
-              <a:rPr lang="en-US"/>
-              <a:pPr/>
-              <a:t>5</a:t>
-            </a:fld>
-            <a:endParaRPr lang="en-US"/>
-          </a:p>
-        </p:txBody>
-      </p:sp>
-      <p:sp>
-        <p:nvSpPr>
           <p:cNvPr id="140290" name="Rectangle 2"/>
           <p:cNvSpPr>
             <a:spLocks noGrp="1" noChangeArrowheads="1"/>
@@ -6705,6 +6592,30 @@
               <a:rPr lang="en-US"/>
               <a:t>Pushdown Automata</a:t>
             </a:r>
+          </a:p>
+        </p:txBody>
+      </p:sp>
+      <p:sp>
+        <p:nvSpPr>
+          <p:cNvPr id="30" name="Slide Number Placeholder 4"/>
+          <p:cNvSpPr>
+            <a:spLocks noGrp="1"/>
+          </p:cNvSpPr>
+          <p:nvPr>
+            <p:ph type="sldNum" sz="quarter" idx="11"/>
+          </p:nvPr>
+        </p:nvSpPr>
+        <p:spPr/>
+        <p:txBody>
+          <a:bodyPr/>
+          <a:lstStyle/>
+          <a:p>
+            <a:fld id="{F950F278-9B0C-A44F-BDA0-E8F997FA71A7}" type="slidenum">
+              <a:rPr lang="en-US"/>
+              <a:pPr/>
+              <a:t>5</a:t>
+            </a:fld>
+            <a:endParaRPr lang="en-US"/>
           </a:p>
         </p:txBody>
       </p:sp>
@@ -7723,13 +7634,8 @@
             </a:pPr>
             <a:r>
               <a:rPr lang="en-US" dirty="0"/>
-              <a:t> an alphabet (terminals</a:t>
-            </a:r>
-            <a:r>
-              <a:rPr lang="en-US" dirty="0" smtClean="0"/>
-              <a:t>), </a:t>
-            </a:r>
-            <a:endParaRPr lang="en-US" dirty="0"/>
+              <a:t> an alphabet (terminals), </a:t>
+            </a:r>
           </a:p>
           <a:p>
             <a:pPr lvl="1">
@@ -7738,24 +7644,15 @@
             </a:pPr>
             <a:r>
               <a:rPr lang="en-US" dirty="0"/>
-              <a:t> stack symbols (like </a:t>
-            </a:r>
-            <a:r>
-              <a:rPr lang="en-US" dirty="0" smtClean="0"/>
-              <a:t>non-terminals and</a:t>
+              <a:t> stack symbols (like non-terminals and</a:t>
             </a:r>
           </a:p>
           <a:p>
             <a:pPr lvl="1"/>
             <a:r>
               <a:rPr lang="en-US" dirty="0"/>
-              <a:t> </a:t>
-            </a:r>
-            <a:r>
-              <a:rPr lang="en-US" dirty="0" smtClean="0"/>
-              <a:t> terminals), </a:t>
-            </a:r>
-            <a:endParaRPr lang="en-US" dirty="0"/>
+              <a:t>  terminals), </a:t>
+            </a:r>
           </a:p>
           <a:p>
             <a:pPr lvl="1">
@@ -7764,13 +7661,8 @@
             </a:pPr>
             <a:r>
               <a:rPr lang="en-US" dirty="0"/>
-              <a:t> a finite-state </a:t>
-            </a:r>
-            <a:r>
-              <a:rPr lang="en-US" dirty="0" smtClean="0"/>
-              <a:t>automaton,</a:t>
-            </a:r>
-            <a:endParaRPr lang="en-US" dirty="0"/>
+              <a:t> a finite-state automaton,</a:t>
+            </a:r>
           </a:p>
           <a:p>
             <a:pPr lvl="1">
@@ -7846,11 +7738,7 @@
             </a:r>
             <a:r>
               <a:rPr lang="en-US"/>
-              <a:t>= </a:t>
-            </a:r>
-            <a:r>
-              <a:rPr lang="en-US" smtClean="0"/>
-              <a:t>1 </a:t>
+              <a:t>= 1 </a:t>
             </a:r>
             <a:r>
               <a:rPr lang="en-US" dirty="0"/>
@@ -8149,14 +8037,11 @@
               </a:spcBef>
             </a:pPr>
             <a:r>
-              <a:rPr lang="en-US" dirty="0" smtClean="0">
+              <a:rPr lang="en-US" dirty="0">
                 <a:sym typeface="Symbol" charset="2"/>
               </a:rPr>
               <a:t>$</a:t>
             </a:r>
-            <a:endParaRPr lang="en-US" dirty="0">
-              <a:sym typeface="Symbol" charset="2"/>
-            </a:endParaRPr>
           </a:p>
         </p:txBody>
       </p:sp>
@@ -8200,14 +8085,11 @@
               </a:spcBef>
             </a:pPr>
             <a:r>
-              <a:rPr lang="en-US" dirty="0" smtClean="0">
+              <a:rPr lang="en-US" dirty="0">
                 <a:sym typeface="Symbol" charset="2"/>
               </a:rPr>
               <a:t>A</a:t>
             </a:r>
-            <a:endParaRPr lang="en-US" dirty="0">
-              <a:sym typeface="Symbol" charset="2"/>
-            </a:endParaRPr>
           </a:p>
         </p:txBody>
       </p:sp>
@@ -8219,7 +8101,7 @@
   <p:timing>
     <p:tnLst>
       <p:par>
-        <p:cTn xmlns:p14="http://schemas.microsoft.com/office/powerpoint/2010/main" id="1" dur="indefinite" restart="never" nodeType="tmRoot">
+        <p:cTn id="1" dur="indefinite" restart="never" nodeType="tmRoot">
           <p:childTnLst>
             <p:seq concurrent="1" nextAc="seek">
               <p:cTn id="2" dur="indefinite" nodeType="mainSeq">
@@ -8940,54 +8822,6 @@
       </p:grpSpPr>
       <p:sp>
         <p:nvSpPr>
-          <p:cNvPr id="6" name="Date Placeholder 2"/>
-          <p:cNvSpPr>
-            <a:spLocks noGrp="1"/>
-          </p:cNvSpPr>
-          <p:nvPr>
-            <p:ph type="dt" sz="half" idx="10"/>
-          </p:nvPr>
-        </p:nvSpPr>
-        <p:spPr/>
-        <p:txBody>
-          <a:bodyPr/>
-          <a:lstStyle/>
-          <a:p>
-            <a:fld id="{EDF16ACC-20BD-004C-977C-0E48D4C39F60}" type="datetime1">
-              <a:rPr lang="en-US"/>
-              <a:pPr/>
-              <a:t>16-06-14</a:t>
-            </a:fld>
-            <a:endParaRPr lang="en-US"/>
-          </a:p>
-        </p:txBody>
-      </p:sp>
-      <p:sp>
-        <p:nvSpPr>
-          <p:cNvPr id="7" name="Slide Number Placeholder 4"/>
-          <p:cNvSpPr>
-            <a:spLocks noGrp="1"/>
-          </p:cNvSpPr>
-          <p:nvPr>
-            <p:ph type="sldNum" sz="quarter" idx="12"/>
-          </p:nvPr>
-        </p:nvSpPr>
-        <p:spPr/>
-        <p:txBody>
-          <a:bodyPr/>
-          <a:lstStyle/>
-          <a:p>
-            <a:fld id="{50CD7ACC-B430-874F-A0D5-0163F1AFB9D4}" type="slidenum">
-              <a:rPr lang="en-US"/>
-              <a:pPr/>
-              <a:t>6</a:t>
-            </a:fld>
-            <a:endParaRPr lang="en-US"/>
-          </a:p>
-        </p:txBody>
-      </p:sp>
-      <p:sp>
-        <p:nvSpPr>
           <p:cNvPr id="90114" name="Rectangle 2"/>
           <p:cNvSpPr>
             <a:spLocks noGrp="1" noChangeArrowheads="1"/>
@@ -9005,6 +8839,30 @@
               <a:rPr lang="en-US"/>
               <a:t>Non-CF Languages</a:t>
             </a:r>
+          </a:p>
+        </p:txBody>
+      </p:sp>
+      <p:sp>
+        <p:nvSpPr>
+          <p:cNvPr id="7" name="Slide Number Placeholder 4"/>
+          <p:cNvSpPr>
+            <a:spLocks noGrp="1"/>
+          </p:cNvSpPr>
+          <p:nvPr>
+            <p:ph type="sldNum" sz="quarter" idx="11"/>
+          </p:nvPr>
+        </p:nvSpPr>
+        <p:spPr/>
+        <p:txBody>
+          <a:bodyPr/>
+          <a:lstStyle/>
+          <a:p>
+            <a:fld id="{50CD7ACC-B430-874F-A0D5-0163F1AFB9D4}" type="slidenum">
+              <a:rPr lang="en-US"/>
+              <a:pPr/>
+              <a:t>6</a:t>
+            </a:fld>
+            <a:endParaRPr lang="en-US"/>
           </a:p>
         </p:txBody>
       </p:sp>
@@ -9096,13 +8954,6 @@
   <p:clrMapOvr>
     <a:masterClrMapping/>
   </p:clrMapOvr>
-  <p:timing>
-    <p:tnLst>
-      <p:par>
-        <p:cTn xmlns:p14="http://schemas.microsoft.com/office/powerpoint/2010/main" id="1" dur="indefinite" restart="never" nodeType="tmRoot"/>
-      </p:par>
-    </p:tnLst>
-  </p:timing>
 </p:sld>
 </file>
 
@@ -9125,54 +8976,6 @@
       </p:grpSpPr>
       <p:sp>
         <p:nvSpPr>
-          <p:cNvPr id="9" name="Date Placeholder 2"/>
-          <p:cNvSpPr>
-            <a:spLocks noGrp="1"/>
-          </p:cNvSpPr>
-          <p:nvPr>
-            <p:ph type="dt" sz="half" idx="10"/>
-          </p:nvPr>
-        </p:nvSpPr>
-        <p:spPr/>
-        <p:txBody>
-          <a:bodyPr/>
-          <a:lstStyle/>
-          <a:p>
-            <a:fld id="{0726135A-2F5C-A342-83D7-8378D6E1D3D6}" type="datetime1">
-              <a:rPr lang="en-US"/>
-              <a:pPr/>
-              <a:t>16-06-14</a:t>
-            </a:fld>
-            <a:endParaRPr lang="en-US"/>
-          </a:p>
-        </p:txBody>
-      </p:sp>
-      <p:sp>
-        <p:nvSpPr>
-          <p:cNvPr id="10" name="Slide Number Placeholder 4"/>
-          <p:cNvSpPr>
-            <a:spLocks noGrp="1"/>
-          </p:cNvSpPr>
-          <p:nvPr>
-            <p:ph type="sldNum" sz="quarter" idx="12"/>
-          </p:nvPr>
-        </p:nvSpPr>
-        <p:spPr/>
-        <p:txBody>
-          <a:bodyPr/>
-          <a:lstStyle/>
-          <a:p>
-            <a:fld id="{F23FA4EE-052C-BD4C-BAC6-E12282472540}" type="slidenum">
-              <a:rPr lang="en-US"/>
-              <a:pPr/>
-              <a:t>7</a:t>
-            </a:fld>
-            <a:endParaRPr lang="en-US"/>
-          </a:p>
-        </p:txBody>
-      </p:sp>
-      <p:sp>
-        <p:nvSpPr>
           <p:cNvPr id="92162" name="Rectangle 2"/>
           <p:cNvSpPr>
             <a:spLocks noGrp="1" noChangeArrowheads="1"/>
@@ -9190,6 +8993,30 @@
               <a:rPr lang="en-US"/>
               <a:t>CF Languages</a:t>
             </a:r>
+          </a:p>
+        </p:txBody>
+      </p:sp>
+      <p:sp>
+        <p:nvSpPr>
+          <p:cNvPr id="10" name="Slide Number Placeholder 4"/>
+          <p:cNvSpPr>
+            <a:spLocks noGrp="1"/>
+          </p:cNvSpPr>
+          <p:nvPr>
+            <p:ph type="sldNum" sz="quarter" idx="11"/>
+          </p:nvPr>
+        </p:nvSpPr>
+        <p:spPr/>
+        <p:txBody>
+          <a:bodyPr/>
+          <a:lstStyle/>
+          <a:p>
+            <a:fld id="{F23FA4EE-052C-BD4C-BAC6-E12282472540}" type="slidenum">
+              <a:rPr lang="en-US"/>
+              <a:pPr/>
+              <a:t>7</a:t>
+            </a:fld>
+            <a:endParaRPr lang="en-US"/>
           </a:p>
         </p:txBody>
       </p:sp>
@@ -9353,7 +9180,7 @@
   <p:timing>
     <p:tnLst>
       <p:par>
-        <p:cTn xmlns:p14="http://schemas.microsoft.com/office/powerpoint/2010/main" id="1" dur="indefinite" restart="never" nodeType="tmRoot">
+        <p:cTn id="1" dur="indefinite" restart="never" nodeType="tmRoot">
           <p:childTnLst>
             <p:seq concurrent="1" nextAc="seek">
               <p:cTn id="2" dur="indefinite" nodeType="mainSeq">
@@ -9582,12 +9409,12 @@
       </p:grpSpPr>
       <p:sp>
         <p:nvSpPr>
-          <p:cNvPr id="4" name="Date Placeholder 3"/>
+          <p:cNvPr id="136194" name="Rectangle 2"/>
           <p:cNvSpPr>
-            <a:spLocks noGrp="1"/>
+            <a:spLocks noGrp="1" noChangeArrowheads="1"/>
           </p:cNvSpPr>
           <p:nvPr>
-            <p:ph type="dt" sz="half" idx="10"/>
+            <p:ph type="title"/>
           </p:nvPr>
         </p:nvSpPr>
         <p:spPr/>
@@ -9595,12 +9422,92 @@
           <a:bodyPr/>
           <a:lstStyle/>
           <a:p>
-            <a:fld id="{1A5AB648-790B-0648-80C2-75DDAD316EFD}" type="datetime1">
+            <a:r>
               <a:rPr lang="en-US"/>
-              <a:pPr/>
-              <a:t>16-06-14</a:t>
-            </a:fld>
-            <a:endParaRPr lang="en-US"/>
+              <a:t>Summary</a:t>
+            </a:r>
+          </a:p>
+        </p:txBody>
+      </p:sp>
+      <p:sp>
+        <p:nvSpPr>
+          <p:cNvPr id="136195" name="Rectangle 3"/>
+          <p:cNvSpPr>
+            <a:spLocks noGrp="1" noChangeArrowheads="1"/>
+          </p:cNvSpPr>
+          <p:nvPr>
+            <p:ph idx="1"/>
+          </p:nvPr>
+        </p:nvSpPr>
+        <p:spPr/>
+        <p:txBody>
+          <a:bodyPr/>
+          <a:lstStyle/>
+          <a:p>
+            <a:pPr>
+              <a:lnSpc>
+                <a:spcPct val="90000"/>
+              </a:lnSpc>
+            </a:pPr>
+            <a:r>
+              <a:rPr lang="en-US" sz="2800" dirty="0"/>
+              <a:t>CFGs can be used describe PL</a:t>
+            </a:r>
+          </a:p>
+          <a:p>
+            <a:pPr>
+              <a:lnSpc>
+                <a:spcPct val="90000"/>
+              </a:lnSpc>
+            </a:pPr>
+            <a:r>
+              <a:rPr lang="en-US" sz="2800" dirty="0"/>
+              <a:t>Derivations correspond to parse trees</a:t>
+            </a:r>
+          </a:p>
+          <a:p>
+            <a:pPr>
+              <a:lnSpc>
+                <a:spcPct val="90000"/>
+              </a:lnSpc>
+            </a:pPr>
+            <a:r>
+              <a:rPr lang="en-US" sz="2800" dirty="0"/>
+              <a:t>Parse trees represent structure of programs</a:t>
+            </a:r>
+          </a:p>
+          <a:p>
+            <a:pPr>
+              <a:lnSpc>
+                <a:spcPct val="90000"/>
+              </a:lnSpc>
+            </a:pPr>
+            <a:r>
+              <a:rPr lang="en-US" sz="2800" dirty="0"/>
+              <a:t>Ambiguous CFGs exist</a:t>
+            </a:r>
+          </a:p>
+          <a:p>
+            <a:pPr>
+              <a:lnSpc>
+                <a:spcPct val="90000"/>
+              </a:lnSpc>
+            </a:pPr>
+            <a:r>
+              <a:rPr lang="en-US" sz="2800" dirty="0"/>
+              <a:t>Some forms of ambiguity can be fixed by changing the grammar</a:t>
+            </a:r>
+          </a:p>
+          <a:p>
+            <a:pPr>
+              <a:lnSpc>
+                <a:spcPct val="90000"/>
+              </a:lnSpc>
+            </a:pPr>
+            <a:r>
+              <a:rPr lang="en-US" sz="2800" dirty="0"/>
+              <a:t>CF languages can be recognized using Pushdown Automata</a:t>
+            </a:r>
           </a:p>
         </p:txBody>
       </p:sp>
@@ -9625,114 +9532,6 @@
               <a:t>8</a:t>
             </a:fld>
             <a:endParaRPr lang="en-US"/>
-          </a:p>
-        </p:txBody>
-      </p:sp>
-      <p:sp>
-        <p:nvSpPr>
-          <p:cNvPr id="136194" name="Rectangle 2"/>
-          <p:cNvSpPr>
-            <a:spLocks noGrp="1" noChangeArrowheads="1"/>
-          </p:cNvSpPr>
-          <p:nvPr>
-            <p:ph type="title"/>
-          </p:nvPr>
-        </p:nvSpPr>
-        <p:spPr/>
-        <p:txBody>
-          <a:bodyPr/>
-          <a:lstStyle/>
-          <a:p>
-            <a:r>
-              <a:rPr lang="en-US"/>
-              <a:t>Summary</a:t>
-            </a:r>
-          </a:p>
-        </p:txBody>
-      </p:sp>
-      <p:sp>
-        <p:nvSpPr>
-          <p:cNvPr id="136195" name="Rectangle 3"/>
-          <p:cNvSpPr>
-            <a:spLocks noGrp="1" noChangeArrowheads="1"/>
-          </p:cNvSpPr>
-          <p:nvPr>
-            <p:ph type="body" idx="1"/>
-          </p:nvPr>
-        </p:nvSpPr>
-        <p:spPr/>
-        <p:txBody>
-          <a:bodyPr/>
-          <a:lstStyle/>
-          <a:p>
-            <a:pPr>
-              <a:lnSpc>
-                <a:spcPct val="90000"/>
-              </a:lnSpc>
-            </a:pPr>
-            <a:r>
-              <a:rPr lang="en-US" sz="2800" dirty="0"/>
-              <a:t>CFGs can be used describe PL</a:t>
-            </a:r>
-          </a:p>
-          <a:p>
-            <a:pPr>
-              <a:lnSpc>
-                <a:spcPct val="90000"/>
-              </a:lnSpc>
-            </a:pPr>
-            <a:r>
-              <a:rPr lang="en-US" sz="2800" dirty="0"/>
-              <a:t>Derivations correspond to parse trees</a:t>
-            </a:r>
-          </a:p>
-          <a:p>
-            <a:pPr>
-              <a:lnSpc>
-                <a:spcPct val="90000"/>
-              </a:lnSpc>
-            </a:pPr>
-            <a:r>
-              <a:rPr lang="en-US" sz="2800" dirty="0"/>
-              <a:t>Parse trees represent structure of programs</a:t>
-            </a:r>
-          </a:p>
-          <a:p>
-            <a:pPr>
-              <a:lnSpc>
-                <a:spcPct val="90000"/>
-              </a:lnSpc>
-            </a:pPr>
-            <a:r>
-              <a:rPr lang="en-US" sz="2800" dirty="0"/>
-              <a:t>Ambiguous CFGs exist</a:t>
-            </a:r>
-          </a:p>
-          <a:p>
-            <a:pPr>
-              <a:lnSpc>
-                <a:spcPct val="90000"/>
-              </a:lnSpc>
-            </a:pPr>
-            <a:r>
-              <a:rPr lang="en-US" sz="2800" dirty="0"/>
-              <a:t>Some forms of ambiguity can be fixed by changing the grammar</a:t>
-            </a:r>
-          </a:p>
-          <a:p>
-            <a:pPr>
-              <a:lnSpc>
-                <a:spcPct val="90000"/>
-              </a:lnSpc>
-            </a:pPr>
-            <a:r>
-              <a:rPr lang="en-US" sz="2800" dirty="0" smtClean="0"/>
-              <a:t>CF </a:t>
-            </a:r>
-            <a:r>
-              <a:rPr lang="en-US" sz="2800" dirty="0"/>
-              <a:t>languages can be recognized using Pushdown Automata</a:t>
-            </a:r>
           </a:p>
         </p:txBody>
       </p:sp>
@@ -9744,7 +9543,7 @@
   <p:timing>
     <p:tnLst>
       <p:par>
-        <p:cTn xmlns:p14="http://schemas.microsoft.com/office/powerpoint/2010/main" id="1" dur="indefinite" restart="never" nodeType="tmRoot">
+        <p:cTn id="1" dur="indefinite" restart="never" nodeType="tmRoot">
           <p:childTnLst>
             <p:seq concurrent="1" nextAc="seek">
               <p:cTn id="2" dur="indefinite" nodeType="mainSeq">
@@ -10072,7 +9871,7 @@
 </file>
 
 <file path=ppt/theme/theme1.xml><?xml version="1.0" encoding="utf-8"?>
-<a:theme xmlns:a="http://schemas.openxmlformats.org/drawingml/2006/main" name="Blank Presentation">
+<a:theme xmlns:a="http://schemas.openxmlformats.org/drawingml/2006/main" name="1_Blank Presentation">
   <a:themeElements>
     <a:clrScheme name="Blank Presentation 1">
       <a:dk1>
@@ -10112,16 +9911,110 @@
         <a:srgbClr val="99CC00"/>
       </a:folHlink>
     </a:clrScheme>
-    <a:fontScheme name="Blank Presentation">
+    <a:fontScheme name="Office">
       <a:majorFont>
-        <a:latin typeface="Times"/>
+        <a:latin typeface="Calibri Light" panose="020F0302020204030204"/>
         <a:ea typeface=""/>
         <a:cs typeface=""/>
+        <a:font script="Jpan" typeface="游ゴシック Light"/>
+        <a:font script="Hang" typeface="맑은 고딕"/>
+        <a:font script="Hans" typeface="等线 Light"/>
+        <a:font script="Hant" typeface="新細明體"/>
+        <a:font script="Arab" typeface="Times New Roman"/>
+        <a:font script="Hebr" typeface="Times New Roman"/>
+        <a:font script="Thai" typeface="Angsana New"/>
+        <a:font script="Ethi" typeface="Nyala"/>
+        <a:font script="Beng" typeface="Vrinda"/>
+        <a:font script="Gujr" typeface="Shruti"/>
+        <a:font script="Khmr" typeface="MoolBoran"/>
+        <a:font script="Knda" typeface="Tunga"/>
+        <a:font script="Guru" typeface="Raavi"/>
+        <a:font script="Cans" typeface="Euphemia"/>
+        <a:font script="Cher" typeface="Plantagenet Cherokee"/>
+        <a:font script="Yiii" typeface="Microsoft Yi Baiti"/>
+        <a:font script="Tibt" typeface="Microsoft Himalaya"/>
+        <a:font script="Thaa" typeface="MV Boli"/>
+        <a:font script="Deva" typeface="Mangal"/>
+        <a:font script="Telu" typeface="Gautami"/>
+        <a:font script="Taml" typeface="Latha"/>
+        <a:font script="Syrc" typeface="Estrangelo Edessa"/>
+        <a:font script="Orya" typeface="Kalinga"/>
+        <a:font script="Mlym" typeface="Kartika"/>
+        <a:font script="Laoo" typeface="DokChampa"/>
+        <a:font script="Sinh" typeface="Iskoola Pota"/>
+        <a:font script="Mong" typeface="Mongolian Baiti"/>
+        <a:font script="Viet" typeface="Times New Roman"/>
+        <a:font script="Uigh" typeface="Microsoft Uighur"/>
+        <a:font script="Geor" typeface="Sylfaen"/>
+        <a:font script="Armn" typeface="Arial"/>
+        <a:font script="Bugi" typeface="Leelawadee UI"/>
+        <a:font script="Bopo" typeface="Microsoft JhengHei"/>
+        <a:font script="Java" typeface="Javanese Text"/>
+        <a:font script="Lisu" typeface="Segoe UI"/>
+        <a:font script="Mymr" typeface="Myanmar Text"/>
+        <a:font script="Nkoo" typeface="Ebrima"/>
+        <a:font script="Olck" typeface="Nirmala UI"/>
+        <a:font script="Osma" typeface="Ebrima"/>
+        <a:font script="Phag" typeface="Phagspa"/>
+        <a:font script="Syrn" typeface="Estrangelo Edessa"/>
+        <a:font script="Syrj" typeface="Estrangelo Edessa"/>
+        <a:font script="Syre" typeface="Estrangelo Edessa"/>
+        <a:font script="Sora" typeface="Nirmala UI"/>
+        <a:font script="Tale" typeface="Microsoft Tai Le"/>
+        <a:font script="Talu" typeface="Microsoft New Tai Lue"/>
+        <a:font script="Tfng" typeface="Ebrima"/>
       </a:majorFont>
       <a:minorFont>
-        <a:latin typeface="Times"/>
+        <a:latin typeface="Calibri" panose="020F0502020204030204"/>
         <a:ea typeface=""/>
         <a:cs typeface=""/>
+        <a:font script="Jpan" typeface="游ゴシック"/>
+        <a:font script="Hang" typeface="맑은 고딕"/>
+        <a:font script="Hans" typeface="等线"/>
+        <a:font script="Hant" typeface="新細明體"/>
+        <a:font script="Arab" typeface="Arial"/>
+        <a:font script="Hebr" typeface="Arial"/>
+        <a:font script="Thai" typeface="Cordia New"/>
+        <a:font script="Ethi" typeface="Nyala"/>
+        <a:font script="Beng" typeface="Vrinda"/>
+        <a:font script="Gujr" typeface="Shruti"/>
+        <a:font script="Khmr" typeface="DaunPenh"/>
+        <a:font script="Knda" typeface="Tunga"/>
+        <a:font script="Guru" typeface="Raavi"/>
+        <a:font script="Cans" typeface="Euphemia"/>
+        <a:font script="Cher" typeface="Plantagenet Cherokee"/>
+        <a:font script="Yiii" typeface="Microsoft Yi Baiti"/>
+        <a:font script="Tibt" typeface="Microsoft Himalaya"/>
+        <a:font script="Thaa" typeface="MV Boli"/>
+        <a:font script="Deva" typeface="Mangal"/>
+        <a:font script="Telu" typeface="Gautami"/>
+        <a:font script="Taml" typeface="Latha"/>
+        <a:font script="Syrc" typeface="Estrangelo Edessa"/>
+        <a:font script="Orya" typeface="Kalinga"/>
+        <a:font script="Mlym" typeface="Kartika"/>
+        <a:font script="Laoo" typeface="DokChampa"/>
+        <a:font script="Sinh" typeface="Iskoola Pota"/>
+        <a:font script="Mong" typeface="Mongolian Baiti"/>
+        <a:font script="Viet" typeface="Arial"/>
+        <a:font script="Uigh" typeface="Microsoft Uighur"/>
+        <a:font script="Geor" typeface="Sylfaen"/>
+        <a:font script="Armn" typeface="Arial"/>
+        <a:font script="Bugi" typeface="Leelawadee UI"/>
+        <a:font script="Bopo" typeface="Microsoft JhengHei"/>
+        <a:font script="Java" typeface="Javanese Text"/>
+        <a:font script="Lisu" typeface="Segoe UI"/>
+        <a:font script="Mymr" typeface="Myanmar Text"/>
+        <a:font script="Nkoo" typeface="Ebrima"/>
+        <a:font script="Olck" typeface="Nirmala UI"/>
+        <a:font script="Osma" typeface="Ebrima"/>
+        <a:font script="Phag" typeface="Phagspa"/>
+        <a:font script="Syrn" typeface="Estrangelo Edessa"/>
+        <a:font script="Syrj" typeface="Estrangelo Edessa"/>
+        <a:font script="Syre" typeface="Estrangelo Edessa"/>
+        <a:font script="Sora" typeface="Nirmala UI"/>
+        <a:font script="Tale" typeface="Microsoft Tai Le"/>
+        <a:font script="Talu" typeface="Microsoft New Tai Lue"/>
+        <a:font script="Tfng" typeface="Ebrima"/>
       </a:minorFont>
     </a:fontScheme>
     <a:fmtScheme name="Office">

</xml_diff>

<commit_message>
replaced master slide with Calibri font version
</commit_message>
<xml_diff>
--- a/assets/ppt/cfg/cfg3-pda.pptx
+++ b/assets/ppt/cfg/cfg3-pda.pptx
@@ -5094,7 +5094,10 @@
           <a:bodyPr/>
           <a:lstStyle/>
           <a:p>
-            <a:endParaRPr lang="en-CA"/>
+            <a:r>
+              <a:rPr lang="en-CA" dirty="0"/>
+              <a:t>Pushdown Automata</a:t>
+            </a:r>
           </a:p>
         </p:txBody>
       </p:sp>

</xml_diff>